<commit_message>
(ray): Diagrama de flujo de información de la cadena de valor
</commit_message>
<xml_diff>
--- a/Cadenas de flujo de valor.pptx
+++ b/Cadenas de flujo de valor.pptx
@@ -290,6 +290,7 @@
           <a:p>
             <a:fld id="{358CBCD5-033F-4AF1-A29F-25E21243B435}" type="datetimeFigureOut">
               <a:rPr lang="es-VE" smtClean="0"/>
+              <a:pPr/>
               <a:t>04/04/2025</a:t>
             </a:fld>
             <a:endParaRPr lang="es-VE"/>
@@ -332,6 +333,7 @@
           <a:p>
             <a:fld id="{CD7448B5-4584-45CB-83F1-320768F04E48}" type="slidenum">
               <a:rPr lang="es-VE" smtClean="0"/>
+              <a:pPr/>
               <a:t>‹Nº›</a:t>
             </a:fld>
             <a:endParaRPr lang="es-VE"/>
@@ -455,6 +457,7 @@
           <a:p>
             <a:fld id="{358CBCD5-033F-4AF1-A29F-25E21243B435}" type="datetimeFigureOut">
               <a:rPr lang="es-VE" smtClean="0"/>
+              <a:pPr/>
               <a:t>04/04/2025</a:t>
             </a:fld>
             <a:endParaRPr lang="es-VE"/>
@@ -497,6 +500,7 @@
           <a:p>
             <a:fld id="{CD7448B5-4584-45CB-83F1-320768F04E48}" type="slidenum">
               <a:rPr lang="es-VE" smtClean="0"/>
+              <a:pPr/>
               <a:t>‹Nº›</a:t>
             </a:fld>
             <a:endParaRPr lang="es-VE"/>
@@ -630,6 +634,7 @@
           <a:p>
             <a:fld id="{358CBCD5-033F-4AF1-A29F-25E21243B435}" type="datetimeFigureOut">
               <a:rPr lang="es-VE" smtClean="0"/>
+              <a:pPr/>
               <a:t>04/04/2025</a:t>
             </a:fld>
             <a:endParaRPr lang="es-VE"/>
@@ -672,6 +677,7 @@
           <a:p>
             <a:fld id="{CD7448B5-4584-45CB-83F1-320768F04E48}" type="slidenum">
               <a:rPr lang="es-VE" smtClean="0"/>
+              <a:pPr/>
               <a:t>‹Nº›</a:t>
             </a:fld>
             <a:endParaRPr lang="es-VE"/>
@@ -795,6 +801,7 @@
           <a:p>
             <a:fld id="{358CBCD5-033F-4AF1-A29F-25E21243B435}" type="datetimeFigureOut">
               <a:rPr lang="es-VE" smtClean="0"/>
+              <a:pPr/>
               <a:t>04/04/2025</a:t>
             </a:fld>
             <a:endParaRPr lang="es-VE"/>
@@ -837,6 +844,7 @@
           <a:p>
             <a:fld id="{CD7448B5-4584-45CB-83F1-320768F04E48}" type="slidenum">
               <a:rPr lang="es-VE" smtClean="0"/>
+              <a:pPr/>
               <a:t>‹Nº›</a:t>
             </a:fld>
             <a:endParaRPr lang="es-VE"/>
@@ -1036,6 +1044,7 @@
           <a:p>
             <a:fld id="{358CBCD5-033F-4AF1-A29F-25E21243B435}" type="datetimeFigureOut">
               <a:rPr lang="es-VE" smtClean="0"/>
+              <a:pPr/>
               <a:t>04/04/2025</a:t>
             </a:fld>
             <a:endParaRPr lang="es-VE"/>
@@ -1078,6 +1087,7 @@
           <a:p>
             <a:fld id="{CD7448B5-4584-45CB-83F1-320768F04E48}" type="slidenum">
               <a:rPr lang="es-VE" smtClean="0"/>
+              <a:pPr/>
               <a:t>‹Nº›</a:t>
             </a:fld>
             <a:endParaRPr lang="es-VE"/>
@@ -1319,6 +1329,7 @@
           <a:p>
             <a:fld id="{358CBCD5-033F-4AF1-A29F-25E21243B435}" type="datetimeFigureOut">
               <a:rPr lang="es-VE" smtClean="0"/>
+              <a:pPr/>
               <a:t>04/04/2025</a:t>
             </a:fld>
             <a:endParaRPr lang="es-VE"/>
@@ -1361,6 +1372,7 @@
           <a:p>
             <a:fld id="{CD7448B5-4584-45CB-83F1-320768F04E48}" type="slidenum">
               <a:rPr lang="es-VE" smtClean="0"/>
+              <a:pPr/>
               <a:t>‹Nº›</a:t>
             </a:fld>
             <a:endParaRPr lang="es-VE"/>
@@ -1736,6 +1748,7 @@
           <a:p>
             <a:fld id="{358CBCD5-033F-4AF1-A29F-25E21243B435}" type="datetimeFigureOut">
               <a:rPr lang="es-VE" smtClean="0"/>
+              <a:pPr/>
               <a:t>04/04/2025</a:t>
             </a:fld>
             <a:endParaRPr lang="es-VE"/>
@@ -1778,6 +1791,7 @@
           <a:p>
             <a:fld id="{CD7448B5-4584-45CB-83F1-320768F04E48}" type="slidenum">
               <a:rPr lang="es-VE" smtClean="0"/>
+              <a:pPr/>
               <a:t>‹Nº›</a:t>
             </a:fld>
             <a:endParaRPr lang="es-VE"/>
@@ -1849,6 +1863,7 @@
           <a:p>
             <a:fld id="{358CBCD5-033F-4AF1-A29F-25E21243B435}" type="datetimeFigureOut">
               <a:rPr lang="es-VE" smtClean="0"/>
+              <a:pPr/>
               <a:t>04/04/2025</a:t>
             </a:fld>
             <a:endParaRPr lang="es-VE"/>
@@ -1891,6 +1906,7 @@
           <a:p>
             <a:fld id="{CD7448B5-4584-45CB-83F1-320768F04E48}" type="slidenum">
               <a:rPr lang="es-VE" smtClean="0"/>
+              <a:pPr/>
               <a:t>‹Nº›</a:t>
             </a:fld>
             <a:endParaRPr lang="es-VE"/>
@@ -1939,6 +1955,7 @@
           <a:p>
             <a:fld id="{358CBCD5-033F-4AF1-A29F-25E21243B435}" type="datetimeFigureOut">
               <a:rPr lang="es-VE" smtClean="0"/>
+              <a:pPr/>
               <a:t>04/04/2025</a:t>
             </a:fld>
             <a:endParaRPr lang="es-VE"/>
@@ -1981,6 +1998,7 @@
           <a:p>
             <a:fld id="{CD7448B5-4584-45CB-83F1-320768F04E48}" type="slidenum">
               <a:rPr lang="es-VE" smtClean="0"/>
+              <a:pPr/>
               <a:t>‹Nº›</a:t>
             </a:fld>
             <a:endParaRPr lang="es-VE"/>
@@ -2211,6 +2229,7 @@
           <a:p>
             <a:fld id="{358CBCD5-033F-4AF1-A29F-25E21243B435}" type="datetimeFigureOut">
               <a:rPr lang="es-VE" smtClean="0"/>
+              <a:pPr/>
               <a:t>04/04/2025</a:t>
             </a:fld>
             <a:endParaRPr lang="es-VE"/>
@@ -2253,6 +2272,7 @@
           <a:p>
             <a:fld id="{CD7448B5-4584-45CB-83F1-320768F04E48}" type="slidenum">
               <a:rPr lang="es-VE" smtClean="0"/>
+              <a:pPr/>
               <a:t>‹Nº›</a:t>
             </a:fld>
             <a:endParaRPr lang="es-VE"/>
@@ -2459,6 +2479,7 @@
           <a:p>
             <a:fld id="{358CBCD5-033F-4AF1-A29F-25E21243B435}" type="datetimeFigureOut">
               <a:rPr lang="es-VE" smtClean="0"/>
+              <a:pPr/>
               <a:t>04/04/2025</a:t>
             </a:fld>
             <a:endParaRPr lang="es-VE"/>
@@ -2501,6 +2522,7 @@
           <a:p>
             <a:fld id="{CD7448B5-4584-45CB-83F1-320768F04E48}" type="slidenum">
               <a:rPr lang="es-VE" smtClean="0"/>
+              <a:pPr/>
               <a:t>‹Nº›</a:t>
             </a:fld>
             <a:endParaRPr lang="es-VE"/>
@@ -2667,6 +2689,7 @@
           <a:p>
             <a:fld id="{358CBCD5-033F-4AF1-A29F-25E21243B435}" type="datetimeFigureOut">
               <a:rPr lang="es-VE" smtClean="0"/>
+              <a:pPr/>
               <a:t>04/04/2025</a:t>
             </a:fld>
             <a:endParaRPr lang="es-VE"/>
@@ -2745,6 +2768,7 @@
           <a:p>
             <a:fld id="{CD7448B5-4584-45CB-83F1-320768F04E48}" type="slidenum">
               <a:rPr lang="es-VE" smtClean="0"/>
+              <a:pPr/>
               <a:t>‹Nº›</a:t>
             </a:fld>
             <a:endParaRPr lang="es-VE"/>
@@ -6598,7 +6622,7 @@
           <p:spPr>
             <a:xfrm>
               <a:off x="146720" y="2276872"/>
-              <a:ext cx="8564880" cy="527432"/>
+              <a:ext cx="8529736" cy="527432"/>
             </a:xfrm>
             <a:custGeom>
               <a:avLst/>
@@ -6814,7 +6838,7 @@
           <p:spPr>
             <a:xfrm>
               <a:off x="138152" y="1867064"/>
-              <a:ext cx="8341360" cy="481816"/>
+              <a:ext cx="8307133" cy="481816"/>
             </a:xfrm>
             <a:custGeom>
               <a:avLst/>
@@ -7022,7 +7046,7 @@
           <p:spPr>
             <a:xfrm>
               <a:off x="127992" y="965200"/>
-              <a:ext cx="7792720" cy="457200"/>
+              <a:ext cx="7756376" cy="457200"/>
             </a:xfrm>
             <a:custGeom>
               <a:avLst/>
@@ -7156,7 +7180,7 @@
           <p:spPr>
             <a:xfrm>
               <a:off x="146720" y="980728"/>
-              <a:ext cx="994439" cy="369332"/>
+              <a:ext cx="1117870" cy="369332"/>
             </a:xfrm>
             <a:prstGeom prst="rect">
               <a:avLst/>
@@ -7171,7 +7195,11 @@
             <a:p>
               <a:r>
                 <a:rPr lang="es-VE" b="1" dirty="0" smtClean="0"/>
-                <a:t>Fianzas: </a:t>
+                <a:t>Finanzas</a:t>
+              </a:r>
+              <a:r>
+                <a:rPr lang="es-VE" b="1" dirty="0" smtClean="0"/>
+                <a:t>: </a:t>
               </a:r>
               <a:endParaRPr lang="es-VE" b="1" dirty="0"/>
             </a:p>
@@ -7538,8 +7566,8 @@
         </p:nvSpPr>
         <p:spPr>
           <a:xfrm>
-            <a:off x="3923928" y="1052736"/>
-            <a:ext cx="1008112" cy="360040"/>
+            <a:off x="3635896" y="1052736"/>
+            <a:ext cx="1008112" cy="288032"/>
           </a:xfrm>
           <a:prstGeom prst="rect">
             <a:avLst/>
@@ -7580,14 +7608,14 @@
           <a:p>
             <a:pPr algn="ctr"/>
             <a:r>
-              <a:rPr lang="es-VE" sz="1200" dirty="0" smtClean="0">
+              <a:rPr lang="es-VE" sz="1100" dirty="0" smtClean="0">
                 <a:solidFill>
                   <a:schemeClr val="tx1"/>
                 </a:solidFill>
               </a:rPr>
-              <a:t>Cobranza</a:t>
-            </a:r>
-            <a:endParaRPr lang="es-VE" sz="1200" dirty="0">
+              <a:t>Cálculo de comisiones</a:t>
+            </a:r>
+            <a:endParaRPr lang="es-VE" sz="1100" dirty="0">
               <a:solidFill>
                 <a:schemeClr val="tx1"/>
               </a:solidFill>
@@ -7603,8 +7631,8 @@
         </p:nvSpPr>
         <p:spPr>
           <a:xfrm>
-            <a:off x="5436096" y="1052736"/>
-            <a:ext cx="1008112" cy="360040"/>
+            <a:off x="5148064" y="1052736"/>
+            <a:ext cx="1008112" cy="288032"/>
           </a:xfrm>
           <a:prstGeom prst="rect">
             <a:avLst/>
@@ -7645,12 +7673,207 @@
           <a:p>
             <a:pPr algn="ctr"/>
             <a:r>
+              <a:rPr lang="es-VE" sz="1100" dirty="0" smtClean="0">
+                <a:solidFill>
+                  <a:schemeClr val="tx1"/>
+                </a:solidFill>
+              </a:rPr>
+              <a:t>Facturación y cobranza</a:t>
+            </a:r>
+            <a:endParaRPr lang="es-VE" sz="1100" dirty="0">
+              <a:solidFill>
+                <a:schemeClr val="tx1"/>
+              </a:solidFill>
+            </a:endParaRPr>
+          </a:p>
+        </p:txBody>
+      </p:sp>
+      <p:sp>
+        <p:nvSpPr>
+          <p:cNvPr id="34" name="33 Rectángulo"/>
+          <p:cNvSpPr/>
+          <p:nvPr/>
+        </p:nvSpPr>
+        <p:spPr>
+          <a:xfrm>
+            <a:off x="1403648" y="1052736"/>
+            <a:ext cx="1008112" cy="288032"/>
+          </a:xfrm>
+          <a:prstGeom prst="rect">
+            <a:avLst/>
+          </a:prstGeom>
+          <a:solidFill>
+            <a:schemeClr val="accent3">
+              <a:lumMod val="40000"/>
+              <a:lumOff val="60000"/>
+            </a:schemeClr>
+          </a:solidFill>
+          <a:ln w="9525">
+            <a:solidFill>
+              <a:schemeClr val="tx2">
+                <a:lumMod val="50000"/>
+              </a:schemeClr>
+            </a:solidFill>
+          </a:ln>
+        </p:spPr>
+        <p:style>
+          <a:lnRef idx="2">
+            <a:schemeClr val="accent1">
+              <a:shade val="50000"/>
+            </a:schemeClr>
+          </a:lnRef>
+          <a:fillRef idx="1">
+            <a:schemeClr val="accent1"/>
+          </a:fillRef>
+          <a:effectRef idx="0">
+            <a:schemeClr val="accent1"/>
+          </a:effectRef>
+          <a:fontRef idx="minor">
+            <a:schemeClr val="lt1"/>
+          </a:fontRef>
+        </p:style>
+        <p:txBody>
+          <a:bodyPr rtlCol="0" anchor="ctr"/>
+          <a:lstStyle/>
+          <a:p>
+            <a:pPr algn="ctr"/>
+            <a:r>
+              <a:rPr lang="es-VE" sz="1100" dirty="0" smtClean="0">
+                <a:solidFill>
+                  <a:schemeClr val="tx1"/>
+                </a:solidFill>
+              </a:rPr>
+              <a:t>Contabilidad</a:t>
+            </a:r>
+            <a:endParaRPr lang="es-VE" sz="1100" dirty="0">
+              <a:solidFill>
+                <a:schemeClr val="tx1"/>
+              </a:solidFill>
+            </a:endParaRPr>
+          </a:p>
+        </p:txBody>
+      </p:sp>
+      <p:sp>
+        <p:nvSpPr>
+          <p:cNvPr id="35" name="34 Rectángulo"/>
+          <p:cNvSpPr/>
+          <p:nvPr/>
+        </p:nvSpPr>
+        <p:spPr>
+          <a:xfrm>
+            <a:off x="5148064" y="5661248"/>
+            <a:ext cx="1008112" cy="360040"/>
+          </a:xfrm>
+          <a:prstGeom prst="rect">
+            <a:avLst/>
+          </a:prstGeom>
+          <a:solidFill>
+            <a:schemeClr val="accent3">
+              <a:lumMod val="40000"/>
+              <a:lumOff val="60000"/>
+            </a:schemeClr>
+          </a:solidFill>
+          <a:ln w="9525">
+            <a:solidFill>
+              <a:schemeClr val="tx2">
+                <a:lumMod val="50000"/>
+              </a:schemeClr>
+            </a:solidFill>
+          </a:ln>
+        </p:spPr>
+        <p:style>
+          <a:lnRef idx="2">
+            <a:schemeClr val="accent1">
+              <a:shade val="50000"/>
+            </a:schemeClr>
+          </a:lnRef>
+          <a:fillRef idx="1">
+            <a:schemeClr val="accent1"/>
+          </a:fillRef>
+          <a:effectRef idx="0">
+            <a:schemeClr val="accent1"/>
+          </a:effectRef>
+          <a:fontRef idx="minor">
+            <a:schemeClr val="lt1"/>
+          </a:fontRef>
+        </p:style>
+        <p:txBody>
+          <a:bodyPr rtlCol="0" anchor="ctr"/>
+          <a:lstStyle/>
+          <a:p>
+            <a:pPr algn="ctr"/>
+            <a:r>
+              <a:rPr lang="es-VE" sz="1100" dirty="0" smtClean="0">
+                <a:solidFill>
+                  <a:schemeClr val="tx1"/>
+                </a:solidFill>
+              </a:rPr>
+              <a:t>Investigación de mercado</a:t>
+            </a:r>
+            <a:endParaRPr lang="es-VE" sz="1100" dirty="0">
+              <a:solidFill>
+                <a:schemeClr val="tx1"/>
+              </a:solidFill>
+            </a:endParaRPr>
+          </a:p>
+        </p:txBody>
+      </p:sp>
+      <p:sp>
+        <p:nvSpPr>
+          <p:cNvPr id="57" name="56 Rectángulo"/>
+          <p:cNvSpPr/>
+          <p:nvPr/>
+        </p:nvSpPr>
+        <p:spPr>
+          <a:xfrm>
+            <a:off x="251520" y="5661248"/>
+            <a:ext cx="1008112" cy="360040"/>
+          </a:xfrm>
+          <a:prstGeom prst="rect">
+            <a:avLst/>
+          </a:prstGeom>
+          <a:solidFill>
+            <a:schemeClr val="accent3">
+              <a:lumMod val="40000"/>
+              <a:lumOff val="60000"/>
+            </a:schemeClr>
+          </a:solidFill>
+          <a:ln w="9525">
+            <a:solidFill>
+              <a:schemeClr val="tx2">
+                <a:lumMod val="50000"/>
+              </a:schemeClr>
+            </a:solidFill>
+          </a:ln>
+        </p:spPr>
+        <p:style>
+          <a:lnRef idx="2">
+            <a:schemeClr val="accent1">
+              <a:shade val="50000"/>
+            </a:schemeClr>
+          </a:lnRef>
+          <a:fillRef idx="1">
+            <a:schemeClr val="accent1"/>
+          </a:fillRef>
+          <a:effectRef idx="0">
+            <a:schemeClr val="accent1"/>
+          </a:effectRef>
+          <a:fontRef idx="minor">
+            <a:schemeClr val="lt1"/>
+          </a:fontRef>
+        </p:style>
+        <p:txBody>
+          <a:bodyPr rtlCol="0" anchor="ctr"/>
+          <a:lstStyle/>
+          <a:p>
+            <a:pPr algn="ctr"/>
+            <a:r>
               <a:rPr lang="es-VE" sz="1200" dirty="0" smtClean="0">
                 <a:solidFill>
                   <a:schemeClr val="tx1"/>
                 </a:solidFill>
               </a:rPr>
-              <a:t>Facturación</a:t>
+              <a:t>Selección de productos</a:t>
             </a:r>
             <a:endParaRPr lang="es-VE" sz="1200" dirty="0">
               <a:solidFill>
@@ -7660,6 +7883,2617 @@
           </a:p>
         </p:txBody>
       </p:sp>
+      <p:sp>
+        <p:nvSpPr>
+          <p:cNvPr id="58" name="57 Rectángulo"/>
+          <p:cNvSpPr/>
+          <p:nvPr/>
+        </p:nvSpPr>
+        <p:spPr>
+          <a:xfrm>
+            <a:off x="2411760" y="1916832"/>
+            <a:ext cx="1008112" cy="360040"/>
+          </a:xfrm>
+          <a:prstGeom prst="rect">
+            <a:avLst/>
+          </a:prstGeom>
+          <a:solidFill>
+            <a:schemeClr val="accent3">
+              <a:lumMod val="40000"/>
+              <a:lumOff val="60000"/>
+            </a:schemeClr>
+          </a:solidFill>
+          <a:ln w="9525">
+            <a:solidFill>
+              <a:schemeClr val="tx2">
+                <a:lumMod val="50000"/>
+              </a:schemeClr>
+            </a:solidFill>
+          </a:ln>
+        </p:spPr>
+        <p:style>
+          <a:lnRef idx="2">
+            <a:schemeClr val="accent1">
+              <a:shade val="50000"/>
+            </a:schemeClr>
+          </a:lnRef>
+          <a:fillRef idx="1">
+            <a:schemeClr val="accent1"/>
+          </a:fillRef>
+          <a:effectRef idx="0">
+            <a:schemeClr val="accent1"/>
+          </a:effectRef>
+          <a:fontRef idx="minor">
+            <a:schemeClr val="lt1"/>
+          </a:fontRef>
+        </p:style>
+        <p:txBody>
+          <a:bodyPr rtlCol="0" anchor="ctr"/>
+          <a:lstStyle/>
+          <a:p>
+            <a:pPr algn="ctr"/>
+            <a:r>
+              <a:rPr lang="es-VE" sz="1100" dirty="0" smtClean="0">
+                <a:solidFill>
+                  <a:schemeClr val="tx1"/>
+                </a:solidFill>
+              </a:rPr>
+              <a:t>Compras</a:t>
+            </a:r>
+            <a:endParaRPr lang="es-VE" sz="1100" dirty="0">
+              <a:solidFill>
+                <a:schemeClr val="tx1"/>
+              </a:solidFill>
+            </a:endParaRPr>
+          </a:p>
+        </p:txBody>
+      </p:sp>
+      <p:sp>
+        <p:nvSpPr>
+          <p:cNvPr id="60" name="59 Rectángulo"/>
+          <p:cNvSpPr/>
+          <p:nvPr/>
+        </p:nvSpPr>
+        <p:spPr>
+          <a:xfrm>
+            <a:off x="7308304" y="4725144"/>
+            <a:ext cx="1080120" cy="432048"/>
+          </a:xfrm>
+          <a:prstGeom prst="rect">
+            <a:avLst/>
+          </a:prstGeom>
+          <a:solidFill>
+            <a:schemeClr val="accent3">
+              <a:lumMod val="40000"/>
+              <a:lumOff val="60000"/>
+            </a:schemeClr>
+          </a:solidFill>
+          <a:ln w="9525">
+            <a:solidFill>
+              <a:schemeClr val="tx2">
+                <a:lumMod val="50000"/>
+              </a:schemeClr>
+            </a:solidFill>
+          </a:ln>
+        </p:spPr>
+        <p:style>
+          <a:lnRef idx="2">
+            <a:schemeClr val="accent1">
+              <a:shade val="50000"/>
+            </a:schemeClr>
+          </a:lnRef>
+          <a:fillRef idx="1">
+            <a:schemeClr val="accent1"/>
+          </a:fillRef>
+          <a:effectRef idx="0">
+            <a:schemeClr val="accent1"/>
+          </a:effectRef>
+          <a:fontRef idx="minor">
+            <a:schemeClr val="lt1"/>
+          </a:fontRef>
+        </p:style>
+        <p:txBody>
+          <a:bodyPr rtlCol="0" anchor="ctr"/>
+          <a:lstStyle/>
+          <a:p>
+            <a:pPr algn="ctr"/>
+            <a:r>
+              <a:rPr lang="es-VE" sz="1100" dirty="0" smtClean="0">
+                <a:solidFill>
+                  <a:schemeClr val="tx1"/>
+                </a:solidFill>
+              </a:rPr>
+              <a:t>Devolución de mercancía</a:t>
+            </a:r>
+            <a:endParaRPr lang="es-VE" sz="1100" dirty="0">
+              <a:solidFill>
+                <a:schemeClr val="tx1"/>
+              </a:solidFill>
+            </a:endParaRPr>
+          </a:p>
+        </p:txBody>
+      </p:sp>
+      <p:sp>
+        <p:nvSpPr>
+          <p:cNvPr id="61" name="60 Rectángulo"/>
+          <p:cNvSpPr/>
+          <p:nvPr/>
+        </p:nvSpPr>
+        <p:spPr>
+          <a:xfrm>
+            <a:off x="5652120" y="5085184"/>
+            <a:ext cx="1080120" cy="432048"/>
+          </a:xfrm>
+          <a:prstGeom prst="rect">
+            <a:avLst/>
+          </a:prstGeom>
+          <a:solidFill>
+            <a:schemeClr val="accent3">
+              <a:lumMod val="40000"/>
+              <a:lumOff val="60000"/>
+            </a:schemeClr>
+          </a:solidFill>
+          <a:ln w="9525">
+            <a:solidFill>
+              <a:schemeClr val="tx2">
+                <a:lumMod val="50000"/>
+              </a:schemeClr>
+            </a:solidFill>
+          </a:ln>
+        </p:spPr>
+        <p:style>
+          <a:lnRef idx="2">
+            <a:schemeClr val="accent1">
+              <a:shade val="50000"/>
+            </a:schemeClr>
+          </a:lnRef>
+          <a:fillRef idx="1">
+            <a:schemeClr val="accent1"/>
+          </a:fillRef>
+          <a:effectRef idx="0">
+            <a:schemeClr val="accent1"/>
+          </a:effectRef>
+          <a:fontRef idx="minor">
+            <a:schemeClr val="lt1"/>
+          </a:fontRef>
+        </p:style>
+        <p:txBody>
+          <a:bodyPr rtlCol="0" anchor="ctr"/>
+          <a:lstStyle/>
+          <a:p>
+            <a:pPr algn="ctr"/>
+            <a:r>
+              <a:rPr lang="es-VE" sz="1100" dirty="0" smtClean="0">
+                <a:solidFill>
+                  <a:schemeClr val="tx1"/>
+                </a:solidFill>
+              </a:rPr>
+              <a:t>Venta de mercancía</a:t>
+            </a:r>
+            <a:endParaRPr lang="es-VE" sz="1100" dirty="0">
+              <a:solidFill>
+                <a:schemeClr val="tx1"/>
+              </a:solidFill>
+            </a:endParaRPr>
+          </a:p>
+        </p:txBody>
+      </p:sp>
+      <p:sp>
+        <p:nvSpPr>
+          <p:cNvPr id="62" name="61 Rectángulo"/>
+          <p:cNvSpPr/>
+          <p:nvPr/>
+        </p:nvSpPr>
+        <p:spPr>
+          <a:xfrm>
+            <a:off x="5724128" y="3068960"/>
+            <a:ext cx="1080120" cy="432048"/>
+          </a:xfrm>
+          <a:prstGeom prst="rect">
+            <a:avLst/>
+          </a:prstGeom>
+          <a:solidFill>
+            <a:schemeClr val="accent3">
+              <a:lumMod val="40000"/>
+              <a:lumOff val="60000"/>
+            </a:schemeClr>
+          </a:solidFill>
+          <a:ln w="9525">
+            <a:solidFill>
+              <a:schemeClr val="tx2">
+                <a:lumMod val="50000"/>
+              </a:schemeClr>
+            </a:solidFill>
+          </a:ln>
+        </p:spPr>
+        <p:style>
+          <a:lnRef idx="2">
+            <a:schemeClr val="accent1">
+              <a:shade val="50000"/>
+            </a:schemeClr>
+          </a:lnRef>
+          <a:fillRef idx="1">
+            <a:schemeClr val="accent1"/>
+          </a:fillRef>
+          <a:effectRef idx="0">
+            <a:schemeClr val="accent1"/>
+          </a:effectRef>
+          <a:fontRef idx="minor">
+            <a:schemeClr val="lt1"/>
+          </a:fontRef>
+        </p:style>
+        <p:txBody>
+          <a:bodyPr rtlCol="0" anchor="ctr"/>
+          <a:lstStyle/>
+          <a:p>
+            <a:pPr algn="ctr"/>
+            <a:r>
+              <a:rPr lang="es-VE" sz="1100" dirty="0" smtClean="0">
+                <a:solidFill>
+                  <a:schemeClr val="tx1"/>
+                </a:solidFill>
+              </a:rPr>
+              <a:t>Negociación de crédito</a:t>
+            </a:r>
+            <a:endParaRPr lang="es-VE" sz="1100" dirty="0">
+              <a:solidFill>
+                <a:schemeClr val="tx1"/>
+              </a:solidFill>
+            </a:endParaRPr>
+          </a:p>
+        </p:txBody>
+      </p:sp>
+      <p:sp>
+        <p:nvSpPr>
+          <p:cNvPr id="63" name="62 Rectángulo"/>
+          <p:cNvSpPr/>
+          <p:nvPr/>
+        </p:nvSpPr>
+        <p:spPr>
+          <a:xfrm>
+            <a:off x="3275856" y="2420888"/>
+            <a:ext cx="1080120" cy="288032"/>
+          </a:xfrm>
+          <a:prstGeom prst="rect">
+            <a:avLst/>
+          </a:prstGeom>
+          <a:solidFill>
+            <a:schemeClr val="accent3">
+              <a:lumMod val="40000"/>
+              <a:lumOff val="60000"/>
+            </a:schemeClr>
+          </a:solidFill>
+          <a:ln w="9525">
+            <a:solidFill>
+              <a:schemeClr val="tx2">
+                <a:lumMod val="50000"/>
+              </a:schemeClr>
+            </a:solidFill>
+          </a:ln>
+        </p:spPr>
+        <p:style>
+          <a:lnRef idx="2">
+            <a:schemeClr val="accent1">
+              <a:shade val="50000"/>
+            </a:schemeClr>
+          </a:lnRef>
+          <a:fillRef idx="1">
+            <a:schemeClr val="accent1"/>
+          </a:fillRef>
+          <a:effectRef idx="0">
+            <a:schemeClr val="accent1"/>
+          </a:effectRef>
+          <a:fontRef idx="minor">
+            <a:schemeClr val="lt1"/>
+          </a:fontRef>
+        </p:style>
+        <p:txBody>
+          <a:bodyPr rtlCol="0" anchor="ctr"/>
+          <a:lstStyle/>
+          <a:p>
+            <a:pPr algn="ctr"/>
+            <a:r>
+              <a:rPr lang="es-VE" sz="1100" dirty="0" smtClean="0">
+                <a:solidFill>
+                  <a:schemeClr val="tx1"/>
+                </a:solidFill>
+              </a:rPr>
+              <a:t>Contratación</a:t>
+            </a:r>
+            <a:endParaRPr lang="es-VE" sz="1100" dirty="0">
+              <a:solidFill>
+                <a:schemeClr val="tx1"/>
+              </a:solidFill>
+            </a:endParaRPr>
+          </a:p>
+        </p:txBody>
+      </p:sp>
+      <p:sp>
+        <p:nvSpPr>
+          <p:cNvPr id="64" name="63 Rectángulo"/>
+          <p:cNvSpPr/>
+          <p:nvPr/>
+        </p:nvSpPr>
+        <p:spPr>
+          <a:xfrm>
+            <a:off x="4211960" y="1484784"/>
+            <a:ext cx="1080120" cy="360040"/>
+          </a:xfrm>
+          <a:prstGeom prst="rect">
+            <a:avLst/>
+          </a:prstGeom>
+          <a:solidFill>
+            <a:schemeClr val="accent3">
+              <a:lumMod val="40000"/>
+              <a:lumOff val="60000"/>
+            </a:schemeClr>
+          </a:solidFill>
+          <a:ln w="9525">
+            <a:solidFill>
+              <a:schemeClr val="tx2">
+                <a:lumMod val="50000"/>
+              </a:schemeClr>
+            </a:solidFill>
+          </a:ln>
+        </p:spPr>
+        <p:style>
+          <a:lnRef idx="2">
+            <a:schemeClr val="accent1">
+              <a:shade val="50000"/>
+            </a:schemeClr>
+          </a:lnRef>
+          <a:fillRef idx="1">
+            <a:schemeClr val="accent1"/>
+          </a:fillRef>
+          <a:effectRef idx="0">
+            <a:schemeClr val="accent1"/>
+          </a:effectRef>
+          <a:fontRef idx="minor">
+            <a:schemeClr val="lt1"/>
+          </a:fontRef>
+        </p:style>
+        <p:txBody>
+          <a:bodyPr rtlCol="0" anchor="ctr"/>
+          <a:lstStyle/>
+          <a:p>
+            <a:pPr algn="ctr"/>
+            <a:r>
+              <a:rPr lang="es-VE" sz="1100" dirty="0" smtClean="0">
+                <a:solidFill>
+                  <a:schemeClr val="tx1"/>
+                </a:solidFill>
+              </a:rPr>
+              <a:t>Optimización de procesos</a:t>
+            </a:r>
+            <a:endParaRPr lang="es-VE" sz="1100" dirty="0">
+              <a:solidFill>
+                <a:schemeClr val="tx1"/>
+              </a:solidFill>
+            </a:endParaRPr>
+          </a:p>
+        </p:txBody>
+      </p:sp>
+      <p:sp>
+        <p:nvSpPr>
+          <p:cNvPr id="66" name="65 Rectángulo"/>
+          <p:cNvSpPr/>
+          <p:nvPr/>
+        </p:nvSpPr>
+        <p:spPr>
+          <a:xfrm>
+            <a:off x="2843808" y="4293096"/>
+            <a:ext cx="1008112" cy="360040"/>
+          </a:xfrm>
+          <a:prstGeom prst="rect">
+            <a:avLst/>
+          </a:prstGeom>
+          <a:solidFill>
+            <a:schemeClr val="accent3">
+              <a:lumMod val="40000"/>
+              <a:lumOff val="60000"/>
+            </a:schemeClr>
+          </a:solidFill>
+          <a:ln w="9525">
+            <a:solidFill>
+              <a:schemeClr val="tx2">
+                <a:lumMod val="50000"/>
+              </a:schemeClr>
+            </a:solidFill>
+          </a:ln>
+        </p:spPr>
+        <p:style>
+          <a:lnRef idx="2">
+            <a:schemeClr val="accent1">
+              <a:shade val="50000"/>
+            </a:schemeClr>
+          </a:lnRef>
+          <a:fillRef idx="1">
+            <a:schemeClr val="accent1"/>
+          </a:fillRef>
+          <a:effectRef idx="0">
+            <a:schemeClr val="accent1"/>
+          </a:effectRef>
+          <a:fontRef idx="minor">
+            <a:schemeClr val="lt1"/>
+          </a:fontRef>
+        </p:style>
+        <p:txBody>
+          <a:bodyPr rtlCol="0" anchor="ctr"/>
+          <a:lstStyle/>
+          <a:p>
+            <a:pPr algn="ctr"/>
+            <a:r>
+              <a:rPr lang="es-VE" sz="1100" dirty="0" smtClean="0">
+                <a:solidFill>
+                  <a:schemeClr val="tx1"/>
+                </a:solidFill>
+              </a:rPr>
+              <a:t>Control de inventario</a:t>
+            </a:r>
+            <a:endParaRPr lang="es-VE" sz="1100" dirty="0">
+              <a:solidFill>
+                <a:schemeClr val="tx1"/>
+              </a:solidFill>
+            </a:endParaRPr>
+          </a:p>
+        </p:txBody>
+      </p:sp>
+      <p:sp>
+        <p:nvSpPr>
+          <p:cNvPr id="67" name="66 Rectángulo"/>
+          <p:cNvSpPr/>
+          <p:nvPr/>
+        </p:nvSpPr>
+        <p:spPr>
+          <a:xfrm>
+            <a:off x="1259632" y="2420888"/>
+            <a:ext cx="1224136" cy="216024"/>
+          </a:xfrm>
+          <a:prstGeom prst="rect">
+            <a:avLst/>
+          </a:prstGeom>
+          <a:solidFill>
+            <a:schemeClr val="accent3">
+              <a:lumMod val="40000"/>
+              <a:lumOff val="60000"/>
+            </a:schemeClr>
+          </a:solidFill>
+          <a:ln w="9525">
+            <a:solidFill>
+              <a:schemeClr val="tx2">
+                <a:lumMod val="50000"/>
+              </a:schemeClr>
+            </a:solidFill>
+          </a:ln>
+        </p:spPr>
+        <p:style>
+          <a:lnRef idx="2">
+            <a:schemeClr val="accent1">
+              <a:shade val="50000"/>
+            </a:schemeClr>
+          </a:lnRef>
+          <a:fillRef idx="1">
+            <a:schemeClr val="accent1"/>
+          </a:fillRef>
+          <a:effectRef idx="0">
+            <a:schemeClr val="accent1"/>
+          </a:effectRef>
+          <a:fontRef idx="minor">
+            <a:schemeClr val="lt1"/>
+          </a:fontRef>
+        </p:style>
+        <p:txBody>
+          <a:bodyPr rtlCol="0" anchor="ctr"/>
+          <a:lstStyle/>
+          <a:p>
+            <a:pPr algn="ctr"/>
+            <a:r>
+              <a:rPr lang="es-VE" sz="1200" dirty="0" smtClean="0">
+                <a:solidFill>
+                  <a:schemeClr val="tx1"/>
+                </a:solidFill>
+              </a:rPr>
+              <a:t>Pago de nómina</a:t>
+            </a:r>
+            <a:endParaRPr lang="es-VE" sz="1200" dirty="0">
+              <a:solidFill>
+                <a:schemeClr val="tx1"/>
+              </a:solidFill>
+            </a:endParaRPr>
+          </a:p>
+        </p:txBody>
+      </p:sp>
+      <p:sp>
+        <p:nvSpPr>
+          <p:cNvPr id="68" name="67 CuadroTexto"/>
+          <p:cNvSpPr txBox="1"/>
+          <p:nvPr/>
+        </p:nvSpPr>
+        <p:spPr>
+          <a:xfrm>
+            <a:off x="7092280" y="1412776"/>
+            <a:ext cx="792088" cy="430887"/>
+          </a:xfrm>
+          <a:prstGeom prst="rect">
+            <a:avLst/>
+          </a:prstGeom>
+          <a:noFill/>
+        </p:spPr>
+        <p:txBody>
+          <a:bodyPr wrap="square" rtlCol="0">
+            <a:spAutoFit/>
+          </a:bodyPr>
+          <a:lstStyle/>
+          <a:p>
+            <a:pPr algn="ctr"/>
+            <a:r>
+              <a:rPr lang="es-VE" sz="1100" dirty="0" smtClean="0"/>
+              <a:t>Todas las áreas</a:t>
+            </a:r>
+            <a:endParaRPr lang="es-VE" sz="1100" dirty="0"/>
+          </a:p>
+        </p:txBody>
+      </p:sp>
+      <p:sp>
+        <p:nvSpPr>
+          <p:cNvPr id="69" name="68 Rectángulo"/>
+          <p:cNvSpPr/>
+          <p:nvPr/>
+        </p:nvSpPr>
+        <p:spPr>
+          <a:xfrm>
+            <a:off x="2699792" y="620688"/>
+            <a:ext cx="1008112" cy="288032"/>
+          </a:xfrm>
+          <a:prstGeom prst="rect">
+            <a:avLst/>
+          </a:prstGeom>
+          <a:solidFill>
+            <a:schemeClr val="accent3">
+              <a:lumMod val="40000"/>
+              <a:lumOff val="60000"/>
+            </a:schemeClr>
+          </a:solidFill>
+          <a:ln w="9525">
+            <a:solidFill>
+              <a:schemeClr val="tx2">
+                <a:lumMod val="50000"/>
+              </a:schemeClr>
+            </a:solidFill>
+          </a:ln>
+        </p:spPr>
+        <p:style>
+          <a:lnRef idx="2">
+            <a:schemeClr val="accent1">
+              <a:shade val="50000"/>
+            </a:schemeClr>
+          </a:lnRef>
+          <a:fillRef idx="1">
+            <a:schemeClr val="accent1"/>
+          </a:fillRef>
+          <a:effectRef idx="0">
+            <a:schemeClr val="accent1"/>
+          </a:effectRef>
+          <a:fontRef idx="minor">
+            <a:schemeClr val="lt1"/>
+          </a:fontRef>
+        </p:style>
+        <p:txBody>
+          <a:bodyPr rtlCol="0" anchor="ctr"/>
+          <a:lstStyle/>
+          <a:p>
+            <a:pPr algn="ctr"/>
+            <a:r>
+              <a:rPr lang="es-VE" sz="1100" dirty="0" smtClean="0">
+                <a:solidFill>
+                  <a:schemeClr val="tx1"/>
+                </a:solidFill>
+              </a:rPr>
+              <a:t>Toma de decisiones</a:t>
+            </a:r>
+            <a:endParaRPr lang="es-VE" sz="1100" dirty="0">
+              <a:solidFill>
+                <a:schemeClr val="tx1"/>
+              </a:solidFill>
+            </a:endParaRPr>
+          </a:p>
+        </p:txBody>
+      </p:sp>
+      <p:sp>
+        <p:nvSpPr>
+          <p:cNvPr id="70" name="69 Rectángulo"/>
+          <p:cNvSpPr/>
+          <p:nvPr/>
+        </p:nvSpPr>
+        <p:spPr>
+          <a:xfrm>
+            <a:off x="6444208" y="1052736"/>
+            <a:ext cx="1080120" cy="288032"/>
+          </a:xfrm>
+          <a:prstGeom prst="rect">
+            <a:avLst/>
+          </a:prstGeom>
+          <a:solidFill>
+            <a:schemeClr val="accent3">
+              <a:lumMod val="40000"/>
+              <a:lumOff val="60000"/>
+            </a:schemeClr>
+          </a:solidFill>
+          <a:ln w="12700">
+            <a:solidFill>
+              <a:schemeClr val="tx2">
+                <a:lumMod val="50000"/>
+              </a:schemeClr>
+            </a:solidFill>
+          </a:ln>
+        </p:spPr>
+        <p:style>
+          <a:lnRef idx="2">
+            <a:schemeClr val="accent1">
+              <a:shade val="50000"/>
+            </a:schemeClr>
+          </a:lnRef>
+          <a:fillRef idx="1">
+            <a:schemeClr val="accent1"/>
+          </a:fillRef>
+          <a:effectRef idx="0">
+            <a:schemeClr val="accent1"/>
+          </a:effectRef>
+          <a:fontRef idx="minor">
+            <a:schemeClr val="lt1"/>
+          </a:fontRef>
+        </p:style>
+        <p:txBody>
+          <a:bodyPr rtlCol="0" anchor="ctr"/>
+          <a:lstStyle/>
+          <a:p>
+            <a:pPr algn="ctr"/>
+            <a:r>
+              <a:rPr lang="es-VE" sz="1100" dirty="0" smtClean="0">
+                <a:solidFill>
+                  <a:schemeClr val="tx1"/>
+                </a:solidFill>
+              </a:rPr>
+              <a:t>Financiamiento</a:t>
+            </a:r>
+            <a:endParaRPr lang="es-VE" sz="1100" dirty="0">
+              <a:solidFill>
+                <a:schemeClr val="tx1"/>
+              </a:solidFill>
+            </a:endParaRPr>
+          </a:p>
+        </p:txBody>
+      </p:sp>
+      <p:sp>
+        <p:nvSpPr>
+          <p:cNvPr id="71" name="70 Rectángulo"/>
+          <p:cNvSpPr/>
+          <p:nvPr/>
+        </p:nvSpPr>
+        <p:spPr>
+          <a:xfrm>
+            <a:off x="5652120" y="1484784"/>
+            <a:ext cx="1080120" cy="360040"/>
+          </a:xfrm>
+          <a:prstGeom prst="rect">
+            <a:avLst/>
+          </a:prstGeom>
+          <a:solidFill>
+            <a:schemeClr val="accent3">
+              <a:lumMod val="40000"/>
+              <a:lumOff val="60000"/>
+            </a:schemeClr>
+          </a:solidFill>
+          <a:ln w="9525">
+            <a:solidFill>
+              <a:schemeClr val="tx2">
+                <a:lumMod val="50000"/>
+              </a:schemeClr>
+            </a:solidFill>
+          </a:ln>
+        </p:spPr>
+        <p:style>
+          <a:lnRef idx="2">
+            <a:schemeClr val="accent1">
+              <a:shade val="50000"/>
+            </a:schemeClr>
+          </a:lnRef>
+          <a:fillRef idx="1">
+            <a:schemeClr val="accent1"/>
+          </a:fillRef>
+          <a:effectRef idx="0">
+            <a:schemeClr val="accent1"/>
+          </a:effectRef>
+          <a:fontRef idx="minor">
+            <a:schemeClr val="lt1"/>
+          </a:fontRef>
+        </p:style>
+        <p:txBody>
+          <a:bodyPr rtlCol="0" anchor="ctr"/>
+          <a:lstStyle/>
+          <a:p>
+            <a:pPr algn="ctr"/>
+            <a:r>
+              <a:rPr lang="es-VE" sz="1100" dirty="0" smtClean="0">
+                <a:solidFill>
+                  <a:schemeClr val="tx1"/>
+                </a:solidFill>
+              </a:rPr>
+              <a:t>Supervisión de sistemas</a:t>
+            </a:r>
+            <a:endParaRPr lang="es-VE" sz="1100" dirty="0">
+              <a:solidFill>
+                <a:schemeClr val="tx1"/>
+              </a:solidFill>
+            </a:endParaRPr>
+          </a:p>
+        </p:txBody>
+      </p:sp>
+      <p:sp>
+        <p:nvSpPr>
+          <p:cNvPr id="75" name="74 Rectángulo"/>
+          <p:cNvSpPr/>
+          <p:nvPr/>
+        </p:nvSpPr>
+        <p:spPr>
+          <a:xfrm>
+            <a:off x="1835696" y="5157192"/>
+            <a:ext cx="1008112" cy="360040"/>
+          </a:xfrm>
+          <a:prstGeom prst="rect">
+            <a:avLst/>
+          </a:prstGeom>
+          <a:solidFill>
+            <a:schemeClr val="accent3">
+              <a:lumMod val="40000"/>
+              <a:lumOff val="60000"/>
+            </a:schemeClr>
+          </a:solidFill>
+          <a:ln w="9525">
+            <a:solidFill>
+              <a:schemeClr val="tx2">
+                <a:lumMod val="50000"/>
+              </a:schemeClr>
+            </a:solidFill>
+          </a:ln>
+        </p:spPr>
+        <p:style>
+          <a:lnRef idx="2">
+            <a:schemeClr val="accent1">
+              <a:shade val="50000"/>
+            </a:schemeClr>
+          </a:lnRef>
+          <a:fillRef idx="1">
+            <a:schemeClr val="accent1"/>
+          </a:fillRef>
+          <a:effectRef idx="0">
+            <a:schemeClr val="accent1"/>
+          </a:effectRef>
+          <a:fontRef idx="minor">
+            <a:schemeClr val="lt1"/>
+          </a:fontRef>
+        </p:style>
+        <p:txBody>
+          <a:bodyPr rtlCol="0" anchor="ctr"/>
+          <a:lstStyle/>
+          <a:p>
+            <a:pPr algn="ctr"/>
+            <a:r>
+              <a:rPr lang="es-VE" sz="1100" dirty="0" smtClean="0">
+                <a:solidFill>
+                  <a:schemeClr val="tx1"/>
+                </a:solidFill>
+              </a:rPr>
+              <a:t>Preparación de pedido</a:t>
+            </a:r>
+            <a:endParaRPr lang="es-VE" sz="1100" dirty="0">
+              <a:solidFill>
+                <a:schemeClr val="tx1"/>
+              </a:solidFill>
+            </a:endParaRPr>
+          </a:p>
+        </p:txBody>
+      </p:sp>
+      <p:sp>
+        <p:nvSpPr>
+          <p:cNvPr id="76" name="75 Rectángulo"/>
+          <p:cNvSpPr/>
+          <p:nvPr/>
+        </p:nvSpPr>
+        <p:spPr>
+          <a:xfrm>
+            <a:off x="4211960" y="4293096"/>
+            <a:ext cx="1008112" cy="360040"/>
+          </a:xfrm>
+          <a:prstGeom prst="rect">
+            <a:avLst/>
+          </a:prstGeom>
+          <a:solidFill>
+            <a:schemeClr val="accent3">
+              <a:lumMod val="40000"/>
+              <a:lumOff val="60000"/>
+            </a:schemeClr>
+          </a:solidFill>
+          <a:ln w="9525">
+            <a:solidFill>
+              <a:schemeClr val="tx2">
+                <a:lumMod val="50000"/>
+              </a:schemeClr>
+            </a:solidFill>
+          </a:ln>
+        </p:spPr>
+        <p:style>
+          <a:lnRef idx="2">
+            <a:schemeClr val="accent1">
+              <a:shade val="50000"/>
+            </a:schemeClr>
+          </a:lnRef>
+          <a:fillRef idx="1">
+            <a:schemeClr val="accent1"/>
+          </a:fillRef>
+          <a:effectRef idx="0">
+            <a:schemeClr val="accent1"/>
+          </a:effectRef>
+          <a:fontRef idx="minor">
+            <a:schemeClr val="lt1"/>
+          </a:fontRef>
+        </p:style>
+        <p:txBody>
+          <a:bodyPr rtlCol="0" anchor="ctr"/>
+          <a:lstStyle/>
+          <a:p>
+            <a:pPr algn="ctr"/>
+            <a:r>
+              <a:rPr lang="es-VE" sz="1100" dirty="0" smtClean="0">
+                <a:solidFill>
+                  <a:schemeClr val="tx1"/>
+                </a:solidFill>
+              </a:rPr>
+              <a:t>Despacho de mercancía</a:t>
+            </a:r>
+            <a:endParaRPr lang="es-VE" sz="1100" dirty="0">
+              <a:solidFill>
+                <a:schemeClr val="tx1"/>
+              </a:solidFill>
+            </a:endParaRPr>
+          </a:p>
+        </p:txBody>
+      </p:sp>
+      <p:sp>
+        <p:nvSpPr>
+          <p:cNvPr id="78" name="77 Rectángulo"/>
+          <p:cNvSpPr/>
+          <p:nvPr/>
+        </p:nvSpPr>
+        <p:spPr>
+          <a:xfrm>
+            <a:off x="5292080" y="2420888"/>
+            <a:ext cx="1152128" cy="288032"/>
+          </a:xfrm>
+          <a:prstGeom prst="rect">
+            <a:avLst/>
+          </a:prstGeom>
+          <a:solidFill>
+            <a:schemeClr val="accent3">
+              <a:lumMod val="40000"/>
+              <a:lumOff val="60000"/>
+            </a:schemeClr>
+          </a:solidFill>
+          <a:ln w="9525">
+            <a:solidFill>
+              <a:schemeClr val="tx2">
+                <a:lumMod val="50000"/>
+              </a:schemeClr>
+            </a:solidFill>
+          </a:ln>
+        </p:spPr>
+        <p:style>
+          <a:lnRef idx="2">
+            <a:schemeClr val="accent1">
+              <a:shade val="50000"/>
+            </a:schemeClr>
+          </a:lnRef>
+          <a:fillRef idx="1">
+            <a:schemeClr val="accent1"/>
+          </a:fillRef>
+          <a:effectRef idx="0">
+            <a:schemeClr val="accent1"/>
+          </a:effectRef>
+          <a:fontRef idx="minor">
+            <a:schemeClr val="lt1"/>
+          </a:fontRef>
+        </p:style>
+        <p:txBody>
+          <a:bodyPr rtlCol="0" anchor="ctr"/>
+          <a:lstStyle/>
+          <a:p>
+            <a:pPr algn="ctr"/>
+            <a:r>
+              <a:rPr lang="es-VE" sz="1100" dirty="0" smtClean="0">
+                <a:solidFill>
+                  <a:schemeClr val="tx1"/>
+                </a:solidFill>
+              </a:rPr>
+              <a:t>Capacitación de personal</a:t>
+            </a:r>
+            <a:endParaRPr lang="es-VE" sz="1100" dirty="0">
+              <a:solidFill>
+                <a:schemeClr val="tx1"/>
+              </a:solidFill>
+            </a:endParaRPr>
+          </a:p>
+        </p:txBody>
+      </p:sp>
+      <p:sp>
+        <p:nvSpPr>
+          <p:cNvPr id="79" name="78 CuadroTexto"/>
+          <p:cNvSpPr txBox="1"/>
+          <p:nvPr/>
+        </p:nvSpPr>
+        <p:spPr>
+          <a:xfrm>
+            <a:off x="7524328" y="2348880"/>
+            <a:ext cx="792088" cy="430887"/>
+          </a:xfrm>
+          <a:prstGeom prst="rect">
+            <a:avLst/>
+          </a:prstGeom>
+          <a:noFill/>
+        </p:spPr>
+        <p:txBody>
+          <a:bodyPr wrap="square" rtlCol="0">
+            <a:spAutoFit/>
+          </a:bodyPr>
+          <a:lstStyle/>
+          <a:p>
+            <a:pPr algn="ctr"/>
+            <a:r>
+              <a:rPr lang="es-VE" sz="1100" dirty="0" smtClean="0"/>
+              <a:t>Todas las áreas</a:t>
+            </a:r>
+            <a:endParaRPr lang="es-VE" sz="1100" dirty="0"/>
+          </a:p>
+        </p:txBody>
+      </p:sp>
+      <p:sp>
+        <p:nvSpPr>
+          <p:cNvPr id="81" name="80 Rectángulo"/>
+          <p:cNvSpPr/>
+          <p:nvPr/>
+        </p:nvSpPr>
+        <p:spPr>
+          <a:xfrm>
+            <a:off x="2195736" y="1484784"/>
+            <a:ext cx="1512168" cy="288032"/>
+          </a:xfrm>
+          <a:prstGeom prst="rect">
+            <a:avLst/>
+          </a:prstGeom>
+          <a:solidFill>
+            <a:schemeClr val="accent3">
+              <a:lumMod val="40000"/>
+              <a:lumOff val="60000"/>
+            </a:schemeClr>
+          </a:solidFill>
+          <a:ln w="9525">
+            <a:solidFill>
+              <a:schemeClr val="tx2">
+                <a:lumMod val="50000"/>
+              </a:schemeClr>
+            </a:solidFill>
+          </a:ln>
+        </p:spPr>
+        <p:style>
+          <a:lnRef idx="2">
+            <a:schemeClr val="accent1">
+              <a:shade val="50000"/>
+            </a:schemeClr>
+          </a:lnRef>
+          <a:fillRef idx="1">
+            <a:schemeClr val="accent1"/>
+          </a:fillRef>
+          <a:effectRef idx="0">
+            <a:schemeClr val="accent1"/>
+          </a:effectRef>
+          <a:fontRef idx="minor">
+            <a:schemeClr val="lt1"/>
+          </a:fontRef>
+        </p:style>
+        <p:txBody>
+          <a:bodyPr rtlCol="0" anchor="ctr"/>
+          <a:lstStyle/>
+          <a:p>
+            <a:pPr algn="ctr"/>
+            <a:r>
+              <a:rPr lang="es-VE" sz="1100" dirty="0" smtClean="0">
+                <a:solidFill>
+                  <a:schemeClr val="tx1"/>
+                </a:solidFill>
+              </a:rPr>
+              <a:t>Adquisición de maquinaria/equipos</a:t>
+            </a:r>
+            <a:endParaRPr lang="es-VE" sz="1100" dirty="0">
+              <a:solidFill>
+                <a:schemeClr val="tx1"/>
+              </a:solidFill>
+            </a:endParaRPr>
+          </a:p>
+        </p:txBody>
+      </p:sp>
+      <p:sp>
+        <p:nvSpPr>
+          <p:cNvPr id="82" name="81 Rectángulo"/>
+          <p:cNvSpPr/>
+          <p:nvPr/>
+        </p:nvSpPr>
+        <p:spPr>
+          <a:xfrm>
+            <a:off x="7308304" y="3573016"/>
+            <a:ext cx="1080120" cy="432048"/>
+          </a:xfrm>
+          <a:prstGeom prst="rect">
+            <a:avLst/>
+          </a:prstGeom>
+          <a:solidFill>
+            <a:schemeClr val="accent3">
+              <a:lumMod val="40000"/>
+              <a:lumOff val="60000"/>
+            </a:schemeClr>
+          </a:solidFill>
+          <a:ln w="9525">
+            <a:solidFill>
+              <a:schemeClr val="tx2">
+                <a:lumMod val="50000"/>
+              </a:schemeClr>
+            </a:solidFill>
+          </a:ln>
+        </p:spPr>
+        <p:style>
+          <a:lnRef idx="2">
+            <a:schemeClr val="accent1">
+              <a:shade val="50000"/>
+            </a:schemeClr>
+          </a:lnRef>
+          <a:fillRef idx="1">
+            <a:schemeClr val="accent1"/>
+          </a:fillRef>
+          <a:effectRef idx="0">
+            <a:schemeClr val="accent1"/>
+          </a:effectRef>
+          <a:fontRef idx="minor">
+            <a:schemeClr val="lt1"/>
+          </a:fontRef>
+        </p:style>
+        <p:txBody>
+          <a:bodyPr rtlCol="0" anchor="ctr"/>
+          <a:lstStyle/>
+          <a:p>
+            <a:pPr algn="ctr"/>
+            <a:r>
+              <a:rPr lang="es-VE" sz="1100" dirty="0" smtClean="0">
+                <a:solidFill>
+                  <a:schemeClr val="tx1"/>
+                </a:solidFill>
+              </a:rPr>
+              <a:t>Control de quejas</a:t>
+            </a:r>
+            <a:endParaRPr lang="es-VE" sz="1100" dirty="0">
+              <a:solidFill>
+                <a:schemeClr val="tx1"/>
+              </a:solidFill>
+            </a:endParaRPr>
+          </a:p>
+        </p:txBody>
+      </p:sp>
+      <p:sp>
+        <p:nvSpPr>
+          <p:cNvPr id="83" name="82 Rectángulo"/>
+          <p:cNvSpPr/>
+          <p:nvPr/>
+        </p:nvSpPr>
+        <p:spPr>
+          <a:xfrm>
+            <a:off x="5724128" y="3789040"/>
+            <a:ext cx="1080120" cy="432048"/>
+          </a:xfrm>
+          <a:prstGeom prst="rect">
+            <a:avLst/>
+          </a:prstGeom>
+          <a:solidFill>
+            <a:schemeClr val="accent3">
+              <a:lumMod val="40000"/>
+              <a:lumOff val="60000"/>
+            </a:schemeClr>
+          </a:solidFill>
+          <a:ln w="9525">
+            <a:solidFill>
+              <a:schemeClr val="tx2">
+                <a:lumMod val="50000"/>
+              </a:schemeClr>
+            </a:solidFill>
+          </a:ln>
+        </p:spPr>
+        <p:style>
+          <a:lnRef idx="2">
+            <a:schemeClr val="accent1">
+              <a:shade val="50000"/>
+            </a:schemeClr>
+          </a:lnRef>
+          <a:fillRef idx="1">
+            <a:schemeClr val="accent1"/>
+          </a:fillRef>
+          <a:effectRef idx="0">
+            <a:schemeClr val="accent1"/>
+          </a:effectRef>
+          <a:fontRef idx="minor">
+            <a:schemeClr val="lt1"/>
+          </a:fontRef>
+        </p:style>
+        <p:txBody>
+          <a:bodyPr rtlCol="0" anchor="ctr"/>
+          <a:lstStyle/>
+          <a:p>
+            <a:pPr algn="ctr"/>
+            <a:r>
+              <a:rPr lang="es-VE" sz="1100" dirty="0" smtClean="0">
+                <a:solidFill>
+                  <a:schemeClr val="tx1"/>
+                </a:solidFill>
+              </a:rPr>
+              <a:t>Verificación de historial</a:t>
+            </a:r>
+            <a:endParaRPr lang="es-VE" sz="1100" dirty="0">
+              <a:solidFill>
+                <a:schemeClr val="tx1"/>
+              </a:solidFill>
+            </a:endParaRPr>
+          </a:p>
+        </p:txBody>
+      </p:sp>
+      <p:sp>
+        <p:nvSpPr>
+          <p:cNvPr id="84" name="83 Rectángulo"/>
+          <p:cNvSpPr/>
+          <p:nvPr/>
+        </p:nvSpPr>
+        <p:spPr>
+          <a:xfrm>
+            <a:off x="3707904" y="2996952"/>
+            <a:ext cx="1008112" cy="360040"/>
+          </a:xfrm>
+          <a:prstGeom prst="rect">
+            <a:avLst/>
+          </a:prstGeom>
+          <a:solidFill>
+            <a:schemeClr val="accent3">
+              <a:lumMod val="40000"/>
+              <a:lumOff val="60000"/>
+            </a:schemeClr>
+          </a:solidFill>
+          <a:ln w="9525">
+            <a:solidFill>
+              <a:schemeClr val="tx2">
+                <a:lumMod val="50000"/>
+              </a:schemeClr>
+            </a:solidFill>
+          </a:ln>
+        </p:spPr>
+        <p:style>
+          <a:lnRef idx="2">
+            <a:schemeClr val="accent1">
+              <a:shade val="50000"/>
+            </a:schemeClr>
+          </a:lnRef>
+          <a:fillRef idx="1">
+            <a:schemeClr val="accent1"/>
+          </a:fillRef>
+          <a:effectRef idx="0">
+            <a:schemeClr val="accent1"/>
+          </a:effectRef>
+          <a:fontRef idx="minor">
+            <a:schemeClr val="lt1"/>
+          </a:fontRef>
+        </p:style>
+        <p:txBody>
+          <a:bodyPr rtlCol="0" anchor="ctr"/>
+          <a:lstStyle/>
+          <a:p>
+            <a:pPr algn="ctr"/>
+            <a:r>
+              <a:rPr lang="es-VE" sz="1100" dirty="0" smtClean="0">
+                <a:solidFill>
+                  <a:schemeClr val="tx1"/>
+                </a:solidFill>
+              </a:rPr>
+              <a:t>Recepción de mercancía</a:t>
+            </a:r>
+            <a:endParaRPr lang="es-VE" sz="1100" dirty="0">
+              <a:solidFill>
+                <a:schemeClr val="tx1"/>
+              </a:solidFill>
+            </a:endParaRPr>
+          </a:p>
+        </p:txBody>
+      </p:sp>
+      <p:sp>
+        <p:nvSpPr>
+          <p:cNvPr id="85" name="84 Rectángulo"/>
+          <p:cNvSpPr/>
+          <p:nvPr/>
+        </p:nvSpPr>
+        <p:spPr>
+          <a:xfrm>
+            <a:off x="3707904" y="3573016"/>
+            <a:ext cx="1008112" cy="360040"/>
+          </a:xfrm>
+          <a:prstGeom prst="rect">
+            <a:avLst/>
+          </a:prstGeom>
+          <a:solidFill>
+            <a:schemeClr val="accent3">
+              <a:lumMod val="40000"/>
+              <a:lumOff val="60000"/>
+            </a:schemeClr>
+          </a:solidFill>
+          <a:ln w="9525">
+            <a:solidFill>
+              <a:schemeClr val="tx2">
+                <a:lumMod val="50000"/>
+              </a:schemeClr>
+            </a:solidFill>
+          </a:ln>
+        </p:spPr>
+        <p:style>
+          <a:lnRef idx="2">
+            <a:schemeClr val="accent1">
+              <a:shade val="50000"/>
+            </a:schemeClr>
+          </a:lnRef>
+          <a:fillRef idx="1">
+            <a:schemeClr val="accent1"/>
+          </a:fillRef>
+          <a:effectRef idx="0">
+            <a:schemeClr val="accent1"/>
+          </a:effectRef>
+          <a:fontRef idx="minor">
+            <a:schemeClr val="lt1"/>
+          </a:fontRef>
+        </p:style>
+        <p:txBody>
+          <a:bodyPr rtlCol="0" anchor="ctr"/>
+          <a:lstStyle/>
+          <a:p>
+            <a:pPr algn="ctr"/>
+            <a:r>
+              <a:rPr lang="es-VE" sz="1100" dirty="0" smtClean="0">
+                <a:solidFill>
+                  <a:schemeClr val="tx1"/>
+                </a:solidFill>
+              </a:rPr>
+              <a:t>Devolución de mercancía</a:t>
+            </a:r>
+            <a:endParaRPr lang="es-VE" sz="1100" dirty="0">
+              <a:solidFill>
+                <a:schemeClr val="tx1"/>
+              </a:solidFill>
+            </a:endParaRPr>
+          </a:p>
+        </p:txBody>
+      </p:sp>
+      <p:cxnSp>
+        <p:nvCxnSpPr>
+          <p:cNvPr id="87" name="86 Conector angular"/>
+          <p:cNvCxnSpPr/>
+          <p:nvPr/>
+        </p:nvCxnSpPr>
+        <p:spPr>
+          <a:xfrm rot="16200000" flipH="1">
+            <a:off x="3023828" y="2384884"/>
+            <a:ext cx="792088" cy="576064"/>
+          </a:xfrm>
+          <a:prstGeom prst="bentConnector3">
+            <a:avLst>
+              <a:gd name="adj1" fmla="val 99684"/>
+            </a:avLst>
+          </a:prstGeom>
+          <a:ln>
+            <a:solidFill>
+              <a:schemeClr val="accent6">
+                <a:lumMod val="75000"/>
+              </a:schemeClr>
+            </a:solidFill>
+            <a:tailEnd type="arrow"/>
+          </a:ln>
+        </p:spPr>
+        <p:style>
+          <a:lnRef idx="1">
+            <a:schemeClr val="accent1"/>
+          </a:lnRef>
+          <a:fillRef idx="0">
+            <a:schemeClr val="accent1"/>
+          </a:fillRef>
+          <a:effectRef idx="0">
+            <a:schemeClr val="accent1"/>
+          </a:effectRef>
+          <a:fontRef idx="minor">
+            <a:schemeClr val="tx1"/>
+          </a:fontRef>
+        </p:style>
+      </p:cxnSp>
+      <p:cxnSp>
+        <p:nvCxnSpPr>
+          <p:cNvPr id="94" name="93 Conector recto de flecha"/>
+          <p:cNvCxnSpPr>
+            <a:stCxn id="63" idx="3"/>
+            <a:endCxn id="78" idx="1"/>
+          </p:cNvCxnSpPr>
+          <p:nvPr/>
+        </p:nvCxnSpPr>
+        <p:spPr>
+          <a:xfrm>
+            <a:off x="4355976" y="2564904"/>
+            <a:ext cx="936104" cy="0"/>
+          </a:xfrm>
+          <a:prstGeom prst="straightConnector1">
+            <a:avLst/>
+          </a:prstGeom>
+          <a:ln>
+            <a:solidFill>
+              <a:schemeClr val="accent6">
+                <a:lumMod val="75000"/>
+              </a:schemeClr>
+            </a:solidFill>
+            <a:tailEnd type="arrow"/>
+          </a:ln>
+        </p:spPr>
+        <p:style>
+          <a:lnRef idx="1">
+            <a:schemeClr val="accent1"/>
+          </a:lnRef>
+          <a:fillRef idx="0">
+            <a:schemeClr val="accent1"/>
+          </a:fillRef>
+          <a:effectRef idx="0">
+            <a:schemeClr val="accent1"/>
+          </a:effectRef>
+          <a:fontRef idx="minor">
+            <a:schemeClr val="tx1"/>
+          </a:fontRef>
+        </p:style>
+      </p:cxnSp>
+      <p:cxnSp>
+        <p:nvCxnSpPr>
+          <p:cNvPr id="96" name="95 Conector recto de flecha"/>
+          <p:cNvCxnSpPr/>
+          <p:nvPr/>
+        </p:nvCxnSpPr>
+        <p:spPr>
+          <a:xfrm>
+            <a:off x="6660232" y="2420888"/>
+            <a:ext cx="864096" cy="0"/>
+          </a:xfrm>
+          <a:prstGeom prst="straightConnector1">
+            <a:avLst/>
+          </a:prstGeom>
+          <a:ln>
+            <a:solidFill>
+              <a:schemeClr val="accent6">
+                <a:lumMod val="75000"/>
+              </a:schemeClr>
+            </a:solidFill>
+            <a:tailEnd type="arrow"/>
+          </a:ln>
+        </p:spPr>
+        <p:style>
+          <a:lnRef idx="1">
+            <a:schemeClr val="accent1"/>
+          </a:lnRef>
+          <a:fillRef idx="0">
+            <a:schemeClr val="accent1"/>
+          </a:fillRef>
+          <a:effectRef idx="0">
+            <a:schemeClr val="accent1"/>
+          </a:effectRef>
+          <a:fontRef idx="minor">
+            <a:schemeClr val="tx1"/>
+          </a:fontRef>
+        </p:style>
+      </p:cxnSp>
+      <p:cxnSp>
+        <p:nvCxnSpPr>
+          <p:cNvPr id="97" name="96 Conector recto de flecha"/>
+          <p:cNvCxnSpPr/>
+          <p:nvPr/>
+        </p:nvCxnSpPr>
+        <p:spPr>
+          <a:xfrm>
+            <a:off x="6660232" y="2564904"/>
+            <a:ext cx="864096" cy="0"/>
+          </a:xfrm>
+          <a:prstGeom prst="straightConnector1">
+            <a:avLst/>
+          </a:prstGeom>
+          <a:ln>
+            <a:solidFill>
+              <a:schemeClr val="accent6">
+                <a:lumMod val="75000"/>
+              </a:schemeClr>
+            </a:solidFill>
+            <a:tailEnd type="arrow"/>
+          </a:ln>
+        </p:spPr>
+        <p:style>
+          <a:lnRef idx="1">
+            <a:schemeClr val="accent1"/>
+          </a:lnRef>
+          <a:fillRef idx="0">
+            <a:schemeClr val="accent1"/>
+          </a:fillRef>
+          <a:effectRef idx="0">
+            <a:schemeClr val="accent1"/>
+          </a:effectRef>
+          <a:fontRef idx="minor">
+            <a:schemeClr val="tx1"/>
+          </a:fontRef>
+        </p:style>
+      </p:cxnSp>
+      <p:cxnSp>
+        <p:nvCxnSpPr>
+          <p:cNvPr id="98" name="97 Conector recto de flecha"/>
+          <p:cNvCxnSpPr/>
+          <p:nvPr/>
+        </p:nvCxnSpPr>
+        <p:spPr>
+          <a:xfrm>
+            <a:off x="6660232" y="2708920"/>
+            <a:ext cx="864096" cy="0"/>
+          </a:xfrm>
+          <a:prstGeom prst="straightConnector1">
+            <a:avLst/>
+          </a:prstGeom>
+          <a:ln>
+            <a:solidFill>
+              <a:schemeClr val="accent6">
+                <a:lumMod val="75000"/>
+              </a:schemeClr>
+            </a:solidFill>
+            <a:tailEnd type="arrow"/>
+          </a:ln>
+        </p:spPr>
+        <p:style>
+          <a:lnRef idx="1">
+            <a:schemeClr val="accent1"/>
+          </a:lnRef>
+          <a:fillRef idx="0">
+            <a:schemeClr val="accent1"/>
+          </a:fillRef>
+          <a:effectRef idx="0">
+            <a:schemeClr val="accent1"/>
+          </a:effectRef>
+          <a:fontRef idx="minor">
+            <a:schemeClr val="tx1"/>
+          </a:fontRef>
+        </p:style>
+      </p:cxnSp>
+      <p:cxnSp>
+        <p:nvCxnSpPr>
+          <p:cNvPr id="102" name="101 Conector recto de flecha"/>
+          <p:cNvCxnSpPr>
+            <a:stCxn id="84" idx="2"/>
+            <a:endCxn id="85" idx="0"/>
+          </p:cNvCxnSpPr>
+          <p:nvPr/>
+        </p:nvCxnSpPr>
+        <p:spPr>
+          <a:xfrm>
+            <a:off x="4211960" y="3356992"/>
+            <a:ext cx="0" cy="216024"/>
+          </a:xfrm>
+          <a:prstGeom prst="straightConnector1">
+            <a:avLst/>
+          </a:prstGeom>
+          <a:ln>
+            <a:solidFill>
+              <a:schemeClr val="accent6">
+                <a:lumMod val="75000"/>
+              </a:schemeClr>
+            </a:solidFill>
+            <a:tailEnd type="arrow"/>
+          </a:ln>
+        </p:spPr>
+        <p:style>
+          <a:lnRef idx="1">
+            <a:schemeClr val="accent1"/>
+          </a:lnRef>
+          <a:fillRef idx="0">
+            <a:schemeClr val="accent1"/>
+          </a:fillRef>
+          <a:effectRef idx="0">
+            <a:schemeClr val="accent1"/>
+          </a:effectRef>
+          <a:fontRef idx="minor">
+            <a:schemeClr val="tx1"/>
+          </a:fontRef>
+        </p:style>
+      </p:cxnSp>
+      <p:cxnSp>
+        <p:nvCxnSpPr>
+          <p:cNvPr id="104" name="103 Conector recto de flecha"/>
+          <p:cNvCxnSpPr>
+            <a:stCxn id="35" idx="1"/>
+            <a:endCxn id="57" idx="3"/>
+          </p:cNvCxnSpPr>
+          <p:nvPr/>
+        </p:nvCxnSpPr>
+        <p:spPr>
+          <a:xfrm flipH="1">
+            <a:off x="1259632" y="5841268"/>
+            <a:ext cx="3888432" cy="0"/>
+          </a:xfrm>
+          <a:prstGeom prst="straightConnector1">
+            <a:avLst/>
+          </a:prstGeom>
+          <a:ln>
+            <a:solidFill>
+              <a:schemeClr val="accent6">
+                <a:lumMod val="75000"/>
+              </a:schemeClr>
+            </a:solidFill>
+            <a:tailEnd type="arrow"/>
+          </a:ln>
+        </p:spPr>
+        <p:style>
+          <a:lnRef idx="1">
+            <a:schemeClr val="accent1"/>
+          </a:lnRef>
+          <a:fillRef idx="0">
+            <a:schemeClr val="accent1"/>
+          </a:fillRef>
+          <a:effectRef idx="0">
+            <a:schemeClr val="accent1"/>
+          </a:effectRef>
+          <a:fontRef idx="minor">
+            <a:schemeClr val="tx1"/>
+          </a:fontRef>
+        </p:style>
+      </p:cxnSp>
+      <p:cxnSp>
+        <p:nvCxnSpPr>
+          <p:cNvPr id="106" name="105 Conector angular"/>
+          <p:cNvCxnSpPr>
+            <a:stCxn id="57" idx="0"/>
+          </p:cNvCxnSpPr>
+          <p:nvPr/>
+        </p:nvCxnSpPr>
+        <p:spPr>
+          <a:xfrm rot="5400000" flipH="1" flipV="1">
+            <a:off x="71500" y="3032956"/>
+            <a:ext cx="3312368" cy="1944216"/>
+          </a:xfrm>
+          <a:prstGeom prst="bentConnector3">
+            <a:avLst>
+              <a:gd name="adj1" fmla="val 50000"/>
+            </a:avLst>
+          </a:prstGeom>
+          <a:ln>
+            <a:solidFill>
+              <a:schemeClr val="accent6">
+                <a:lumMod val="75000"/>
+              </a:schemeClr>
+            </a:solidFill>
+            <a:tailEnd type="arrow"/>
+          </a:ln>
+        </p:spPr>
+        <p:style>
+          <a:lnRef idx="1">
+            <a:schemeClr val="accent1"/>
+          </a:lnRef>
+          <a:fillRef idx="0">
+            <a:schemeClr val="accent1"/>
+          </a:fillRef>
+          <a:effectRef idx="0">
+            <a:schemeClr val="accent1"/>
+          </a:effectRef>
+          <a:fontRef idx="minor">
+            <a:schemeClr val="tx1"/>
+          </a:fontRef>
+        </p:style>
+      </p:cxnSp>
+      <p:cxnSp>
+        <p:nvCxnSpPr>
+          <p:cNvPr id="113" name="112 Forma"/>
+          <p:cNvCxnSpPr>
+            <a:stCxn id="84" idx="1"/>
+            <a:endCxn id="66" idx="0"/>
+          </p:cNvCxnSpPr>
+          <p:nvPr/>
+        </p:nvCxnSpPr>
+        <p:spPr>
+          <a:xfrm rot="10800000" flipV="1">
+            <a:off x="3347864" y="3176972"/>
+            <a:ext cx="360040" cy="1116124"/>
+          </a:xfrm>
+          <a:prstGeom prst="bentConnector2">
+            <a:avLst/>
+          </a:prstGeom>
+          <a:ln>
+            <a:solidFill>
+              <a:schemeClr val="accent6">
+                <a:lumMod val="75000"/>
+              </a:schemeClr>
+            </a:solidFill>
+            <a:tailEnd type="arrow"/>
+          </a:ln>
+        </p:spPr>
+        <p:style>
+          <a:lnRef idx="1">
+            <a:schemeClr val="accent1"/>
+          </a:lnRef>
+          <a:fillRef idx="0">
+            <a:schemeClr val="accent1"/>
+          </a:fillRef>
+          <a:effectRef idx="0">
+            <a:schemeClr val="accent1"/>
+          </a:effectRef>
+          <a:fontRef idx="minor">
+            <a:schemeClr val="tx1"/>
+          </a:fontRef>
+        </p:style>
+      </p:cxnSp>
+      <p:cxnSp>
+        <p:nvCxnSpPr>
+          <p:cNvPr id="117" name="116 Conector angular"/>
+          <p:cNvCxnSpPr>
+            <a:stCxn id="85" idx="1"/>
+            <a:endCxn id="58" idx="2"/>
+          </p:cNvCxnSpPr>
+          <p:nvPr/>
+        </p:nvCxnSpPr>
+        <p:spPr>
+          <a:xfrm rot="10800000">
+            <a:off x="2915816" y="2276872"/>
+            <a:ext cx="792088" cy="1476164"/>
+          </a:xfrm>
+          <a:prstGeom prst="bentConnector2">
+            <a:avLst/>
+          </a:prstGeom>
+          <a:ln>
+            <a:solidFill>
+              <a:schemeClr val="accent6">
+                <a:lumMod val="75000"/>
+              </a:schemeClr>
+            </a:solidFill>
+            <a:tailEnd type="arrow"/>
+          </a:ln>
+        </p:spPr>
+        <p:style>
+          <a:lnRef idx="1">
+            <a:schemeClr val="accent1"/>
+          </a:lnRef>
+          <a:fillRef idx="0">
+            <a:schemeClr val="accent1"/>
+          </a:fillRef>
+          <a:effectRef idx="0">
+            <a:schemeClr val="accent1"/>
+          </a:effectRef>
+          <a:fontRef idx="minor">
+            <a:schemeClr val="tx1"/>
+          </a:fontRef>
+        </p:style>
+      </p:cxnSp>
+      <p:cxnSp>
+        <p:nvCxnSpPr>
+          <p:cNvPr id="122" name="121 Conector angular"/>
+          <p:cNvCxnSpPr>
+            <a:stCxn id="66" idx="1"/>
+            <a:endCxn id="75" idx="0"/>
+          </p:cNvCxnSpPr>
+          <p:nvPr/>
+        </p:nvCxnSpPr>
+        <p:spPr>
+          <a:xfrm rot="10800000" flipV="1">
+            <a:off x="2339752" y="4473116"/>
+            <a:ext cx="504056" cy="684076"/>
+          </a:xfrm>
+          <a:prstGeom prst="bentConnector2">
+            <a:avLst/>
+          </a:prstGeom>
+          <a:ln>
+            <a:solidFill>
+              <a:schemeClr val="accent6">
+                <a:lumMod val="75000"/>
+              </a:schemeClr>
+            </a:solidFill>
+            <a:tailEnd type="arrow"/>
+          </a:ln>
+        </p:spPr>
+        <p:style>
+          <a:lnRef idx="1">
+            <a:schemeClr val="accent1"/>
+          </a:lnRef>
+          <a:fillRef idx="0">
+            <a:schemeClr val="accent1"/>
+          </a:fillRef>
+          <a:effectRef idx="0">
+            <a:schemeClr val="accent1"/>
+          </a:effectRef>
+          <a:fontRef idx="minor">
+            <a:schemeClr val="tx1"/>
+          </a:fontRef>
+        </p:style>
+      </p:cxnSp>
+      <p:cxnSp>
+        <p:nvCxnSpPr>
+          <p:cNvPr id="138" name="137 Conector angular"/>
+          <p:cNvCxnSpPr>
+            <a:stCxn id="61" idx="1"/>
+            <a:endCxn id="66" idx="2"/>
+          </p:cNvCxnSpPr>
+          <p:nvPr/>
+        </p:nvCxnSpPr>
+        <p:spPr>
+          <a:xfrm rot="10800000">
+            <a:off x="3347864" y="4653136"/>
+            <a:ext cx="2304256" cy="648072"/>
+          </a:xfrm>
+          <a:prstGeom prst="bentConnector2">
+            <a:avLst/>
+          </a:prstGeom>
+          <a:ln>
+            <a:solidFill>
+              <a:schemeClr val="accent6">
+                <a:lumMod val="75000"/>
+              </a:schemeClr>
+            </a:solidFill>
+            <a:tailEnd type="arrow"/>
+          </a:ln>
+        </p:spPr>
+        <p:style>
+          <a:lnRef idx="1">
+            <a:schemeClr val="accent1"/>
+          </a:lnRef>
+          <a:fillRef idx="0">
+            <a:schemeClr val="accent1"/>
+          </a:fillRef>
+          <a:effectRef idx="0">
+            <a:schemeClr val="accent1"/>
+          </a:effectRef>
+          <a:fontRef idx="minor">
+            <a:schemeClr val="tx1"/>
+          </a:fontRef>
+        </p:style>
+      </p:cxnSp>
+      <p:cxnSp>
+        <p:nvCxnSpPr>
+          <p:cNvPr id="146" name="145 Conector recto de flecha"/>
+          <p:cNvCxnSpPr/>
+          <p:nvPr/>
+        </p:nvCxnSpPr>
+        <p:spPr>
+          <a:xfrm>
+            <a:off x="2843808" y="5445224"/>
+            <a:ext cx="2808312" cy="0"/>
+          </a:xfrm>
+          <a:prstGeom prst="straightConnector1">
+            <a:avLst/>
+          </a:prstGeom>
+          <a:ln>
+            <a:solidFill>
+              <a:schemeClr val="accent6">
+                <a:lumMod val="75000"/>
+              </a:schemeClr>
+            </a:solidFill>
+            <a:tailEnd type="arrow"/>
+          </a:ln>
+        </p:spPr>
+        <p:style>
+          <a:lnRef idx="1">
+            <a:schemeClr val="accent1"/>
+          </a:lnRef>
+          <a:fillRef idx="0">
+            <a:schemeClr val="accent1"/>
+          </a:fillRef>
+          <a:effectRef idx="0">
+            <a:schemeClr val="accent1"/>
+          </a:effectRef>
+          <a:fontRef idx="minor">
+            <a:schemeClr val="tx1"/>
+          </a:fontRef>
+        </p:style>
+      </p:cxnSp>
+      <p:cxnSp>
+        <p:nvCxnSpPr>
+          <p:cNvPr id="152" name="151 Conector recto de flecha"/>
+          <p:cNvCxnSpPr/>
+          <p:nvPr/>
+        </p:nvCxnSpPr>
+        <p:spPr>
+          <a:xfrm flipV="1">
+            <a:off x="6516216" y="4221088"/>
+            <a:ext cx="0" cy="864096"/>
+          </a:xfrm>
+          <a:prstGeom prst="straightConnector1">
+            <a:avLst/>
+          </a:prstGeom>
+          <a:ln>
+            <a:solidFill>
+              <a:schemeClr val="accent6">
+                <a:lumMod val="75000"/>
+              </a:schemeClr>
+            </a:solidFill>
+            <a:tailEnd type="arrow"/>
+          </a:ln>
+        </p:spPr>
+        <p:style>
+          <a:lnRef idx="1">
+            <a:schemeClr val="accent1"/>
+          </a:lnRef>
+          <a:fillRef idx="0">
+            <a:schemeClr val="accent1"/>
+          </a:fillRef>
+          <a:effectRef idx="0">
+            <a:schemeClr val="accent1"/>
+          </a:effectRef>
+          <a:fontRef idx="minor">
+            <a:schemeClr val="tx1"/>
+          </a:fontRef>
+        </p:style>
+      </p:cxnSp>
+      <p:cxnSp>
+        <p:nvCxnSpPr>
+          <p:cNvPr id="158" name="157 Conector recto de flecha"/>
+          <p:cNvCxnSpPr/>
+          <p:nvPr/>
+        </p:nvCxnSpPr>
+        <p:spPr>
+          <a:xfrm flipV="1">
+            <a:off x="6516216" y="3501008"/>
+            <a:ext cx="0" cy="288032"/>
+          </a:xfrm>
+          <a:prstGeom prst="straightConnector1">
+            <a:avLst/>
+          </a:prstGeom>
+          <a:ln>
+            <a:solidFill>
+              <a:schemeClr val="accent6">
+                <a:lumMod val="75000"/>
+              </a:schemeClr>
+            </a:solidFill>
+            <a:tailEnd type="arrow"/>
+          </a:ln>
+        </p:spPr>
+        <p:style>
+          <a:lnRef idx="1">
+            <a:schemeClr val="accent1"/>
+          </a:lnRef>
+          <a:fillRef idx="0">
+            <a:schemeClr val="accent1"/>
+          </a:fillRef>
+          <a:effectRef idx="0">
+            <a:schemeClr val="accent1"/>
+          </a:effectRef>
+          <a:fontRef idx="minor">
+            <a:schemeClr val="tx1"/>
+          </a:fontRef>
+        </p:style>
+      </p:cxnSp>
+      <p:cxnSp>
+        <p:nvCxnSpPr>
+          <p:cNvPr id="165" name="164 Forma"/>
+          <p:cNvCxnSpPr>
+            <a:endCxn id="76" idx="2"/>
+          </p:cNvCxnSpPr>
+          <p:nvPr/>
+        </p:nvCxnSpPr>
+        <p:spPr>
+          <a:xfrm rot="10800000">
+            <a:off x="4716016" y="4653136"/>
+            <a:ext cx="936104" cy="504056"/>
+          </a:xfrm>
+          <a:prstGeom prst="bentConnector2">
+            <a:avLst/>
+          </a:prstGeom>
+          <a:ln>
+            <a:solidFill>
+              <a:schemeClr val="accent6">
+                <a:lumMod val="75000"/>
+              </a:schemeClr>
+            </a:solidFill>
+            <a:tailEnd type="arrow"/>
+          </a:ln>
+        </p:spPr>
+        <p:style>
+          <a:lnRef idx="1">
+            <a:schemeClr val="accent1"/>
+          </a:lnRef>
+          <a:fillRef idx="0">
+            <a:schemeClr val="accent1"/>
+          </a:fillRef>
+          <a:effectRef idx="0">
+            <a:schemeClr val="accent1"/>
+          </a:effectRef>
+          <a:fontRef idx="minor">
+            <a:schemeClr val="tx1"/>
+          </a:fontRef>
+        </p:style>
+      </p:cxnSp>
+      <p:cxnSp>
+        <p:nvCxnSpPr>
+          <p:cNvPr id="176" name="175 Conector angular"/>
+          <p:cNvCxnSpPr>
+            <a:stCxn id="60" idx="1"/>
+          </p:cNvCxnSpPr>
+          <p:nvPr/>
+        </p:nvCxnSpPr>
+        <p:spPr>
+          <a:xfrm rot="10800000">
+            <a:off x="3635896" y="4653136"/>
+            <a:ext cx="3672408" cy="288032"/>
+          </a:xfrm>
+          <a:prstGeom prst="bentConnector3">
+            <a:avLst>
+              <a:gd name="adj1" fmla="val 100114"/>
+            </a:avLst>
+          </a:prstGeom>
+          <a:ln>
+            <a:solidFill>
+              <a:schemeClr val="accent6">
+                <a:lumMod val="75000"/>
+              </a:schemeClr>
+            </a:solidFill>
+            <a:tailEnd type="arrow"/>
+          </a:ln>
+        </p:spPr>
+        <p:style>
+          <a:lnRef idx="1">
+            <a:schemeClr val="accent1"/>
+          </a:lnRef>
+          <a:fillRef idx="0">
+            <a:schemeClr val="accent1"/>
+          </a:fillRef>
+          <a:effectRef idx="0">
+            <a:schemeClr val="accent1"/>
+          </a:effectRef>
+          <a:fontRef idx="minor">
+            <a:schemeClr val="tx1"/>
+          </a:fontRef>
+        </p:style>
+      </p:cxnSp>
+      <p:cxnSp>
+        <p:nvCxnSpPr>
+          <p:cNvPr id="186" name="185 Forma"/>
+          <p:cNvCxnSpPr>
+            <a:stCxn id="69" idx="3"/>
+            <a:endCxn id="70" idx="0"/>
+          </p:cNvCxnSpPr>
+          <p:nvPr/>
+        </p:nvCxnSpPr>
+        <p:spPr>
+          <a:xfrm>
+            <a:off x="3707904" y="764704"/>
+            <a:ext cx="3276364" cy="288032"/>
+          </a:xfrm>
+          <a:prstGeom prst="bentConnector2">
+            <a:avLst/>
+          </a:prstGeom>
+          <a:ln>
+            <a:solidFill>
+              <a:schemeClr val="accent6">
+                <a:lumMod val="75000"/>
+              </a:schemeClr>
+            </a:solidFill>
+            <a:tailEnd type="arrow"/>
+          </a:ln>
+        </p:spPr>
+        <p:style>
+          <a:lnRef idx="1">
+            <a:schemeClr val="accent1"/>
+          </a:lnRef>
+          <a:fillRef idx="0">
+            <a:schemeClr val="accent1"/>
+          </a:fillRef>
+          <a:effectRef idx="0">
+            <a:schemeClr val="accent1"/>
+          </a:effectRef>
+          <a:fontRef idx="minor">
+            <a:schemeClr val="tx1"/>
+          </a:fontRef>
+        </p:style>
+      </p:cxnSp>
+      <p:cxnSp>
+        <p:nvCxnSpPr>
+          <p:cNvPr id="193" name="192 Conector recto de flecha"/>
+          <p:cNvCxnSpPr>
+            <a:stCxn id="64" idx="3"/>
+            <a:endCxn id="71" idx="1"/>
+          </p:cNvCxnSpPr>
+          <p:nvPr/>
+        </p:nvCxnSpPr>
+        <p:spPr>
+          <a:xfrm>
+            <a:off x="5292080" y="1664804"/>
+            <a:ext cx="360040" cy="0"/>
+          </a:xfrm>
+          <a:prstGeom prst="straightConnector1">
+            <a:avLst/>
+          </a:prstGeom>
+          <a:ln>
+            <a:solidFill>
+              <a:schemeClr val="accent6">
+                <a:lumMod val="75000"/>
+              </a:schemeClr>
+            </a:solidFill>
+            <a:tailEnd type="arrow"/>
+          </a:ln>
+        </p:spPr>
+        <p:style>
+          <a:lnRef idx="1">
+            <a:schemeClr val="accent1"/>
+          </a:lnRef>
+          <a:fillRef idx="0">
+            <a:schemeClr val="accent1"/>
+          </a:fillRef>
+          <a:effectRef idx="0">
+            <a:schemeClr val="accent1"/>
+          </a:effectRef>
+          <a:fontRef idx="minor">
+            <a:schemeClr val="tx1"/>
+          </a:fontRef>
+        </p:style>
+      </p:cxnSp>
+      <p:cxnSp>
+        <p:nvCxnSpPr>
+          <p:cNvPr id="195" name="194 Forma"/>
+          <p:cNvCxnSpPr>
+            <a:endCxn id="33" idx="3"/>
+          </p:cNvCxnSpPr>
+          <p:nvPr/>
+        </p:nvCxnSpPr>
+        <p:spPr>
+          <a:xfrm rot="16200000" flipV="1">
+            <a:off x="5328084" y="2024844"/>
+            <a:ext cx="1872208" cy="216024"/>
+          </a:xfrm>
+          <a:prstGeom prst="bentConnector2">
+            <a:avLst/>
+          </a:prstGeom>
+          <a:ln>
+            <a:solidFill>
+              <a:schemeClr val="accent6">
+                <a:lumMod val="75000"/>
+              </a:schemeClr>
+            </a:solidFill>
+            <a:tailEnd type="arrow"/>
+          </a:ln>
+        </p:spPr>
+        <p:style>
+          <a:lnRef idx="1">
+            <a:schemeClr val="accent1"/>
+          </a:lnRef>
+          <a:fillRef idx="0">
+            <a:schemeClr val="accent1"/>
+          </a:fillRef>
+          <a:effectRef idx="0">
+            <a:schemeClr val="accent1"/>
+          </a:effectRef>
+          <a:fontRef idx="minor">
+            <a:schemeClr val="tx1"/>
+          </a:fontRef>
+        </p:style>
+      </p:cxnSp>
+      <p:cxnSp>
+        <p:nvCxnSpPr>
+          <p:cNvPr id="199" name="198 Conector angular"/>
+          <p:cNvCxnSpPr/>
+          <p:nvPr/>
+        </p:nvCxnSpPr>
+        <p:spPr>
+          <a:xfrm rot="16200000" flipV="1">
+            <a:off x="3779912" y="2996952"/>
+            <a:ext cx="3744416" cy="432048"/>
+          </a:xfrm>
+          <a:prstGeom prst="bentConnector3">
+            <a:avLst>
+              <a:gd name="adj1" fmla="val 12906"/>
+            </a:avLst>
+          </a:prstGeom>
+          <a:ln>
+            <a:solidFill>
+              <a:schemeClr val="accent6">
+                <a:lumMod val="75000"/>
+              </a:schemeClr>
+            </a:solidFill>
+            <a:tailEnd type="arrow"/>
+          </a:ln>
+        </p:spPr>
+        <p:style>
+          <a:lnRef idx="1">
+            <a:schemeClr val="accent1"/>
+          </a:lnRef>
+          <a:fillRef idx="0">
+            <a:schemeClr val="accent1"/>
+          </a:fillRef>
+          <a:effectRef idx="0">
+            <a:schemeClr val="accent1"/>
+          </a:effectRef>
+          <a:fontRef idx="minor">
+            <a:schemeClr val="tx1"/>
+          </a:fontRef>
+        </p:style>
+      </p:cxnSp>
+      <p:cxnSp>
+        <p:nvCxnSpPr>
+          <p:cNvPr id="202" name="201 Conector recto de flecha"/>
+          <p:cNvCxnSpPr>
+            <a:stCxn id="82" idx="2"/>
+            <a:endCxn id="60" idx="0"/>
+          </p:cNvCxnSpPr>
+          <p:nvPr/>
+        </p:nvCxnSpPr>
+        <p:spPr>
+          <a:xfrm>
+            <a:off x="7848364" y="4005064"/>
+            <a:ext cx="0" cy="720080"/>
+          </a:xfrm>
+          <a:prstGeom prst="straightConnector1">
+            <a:avLst/>
+          </a:prstGeom>
+          <a:ln>
+            <a:solidFill>
+              <a:schemeClr val="accent6">
+                <a:lumMod val="75000"/>
+              </a:schemeClr>
+            </a:solidFill>
+            <a:tailEnd type="arrow"/>
+          </a:ln>
+        </p:spPr>
+        <p:style>
+          <a:lnRef idx="1">
+            <a:schemeClr val="accent1"/>
+          </a:lnRef>
+          <a:fillRef idx="0">
+            <a:schemeClr val="accent1"/>
+          </a:fillRef>
+          <a:effectRef idx="0">
+            <a:schemeClr val="accent1"/>
+          </a:effectRef>
+          <a:fontRef idx="minor">
+            <a:schemeClr val="tx1"/>
+          </a:fontRef>
+        </p:style>
+      </p:cxnSp>
+      <p:cxnSp>
+        <p:nvCxnSpPr>
+          <p:cNvPr id="204" name="203 Forma"/>
+          <p:cNvCxnSpPr>
+            <a:stCxn id="34" idx="0"/>
+            <a:endCxn id="69" idx="1"/>
+          </p:cNvCxnSpPr>
+          <p:nvPr/>
+        </p:nvCxnSpPr>
+        <p:spPr>
+          <a:xfrm rot="5400000" flipH="1" flipV="1">
+            <a:off x="2159732" y="512676"/>
+            <a:ext cx="288032" cy="792088"/>
+          </a:xfrm>
+          <a:prstGeom prst="bentConnector2">
+            <a:avLst/>
+          </a:prstGeom>
+          <a:ln>
+            <a:solidFill>
+              <a:schemeClr val="accent6">
+                <a:lumMod val="75000"/>
+              </a:schemeClr>
+            </a:solidFill>
+            <a:tailEnd type="arrow"/>
+          </a:ln>
+        </p:spPr>
+        <p:style>
+          <a:lnRef idx="1">
+            <a:schemeClr val="accent1"/>
+          </a:lnRef>
+          <a:fillRef idx="0">
+            <a:schemeClr val="accent1"/>
+          </a:fillRef>
+          <a:effectRef idx="0">
+            <a:schemeClr val="accent1"/>
+          </a:effectRef>
+          <a:fontRef idx="minor">
+            <a:schemeClr val="tx1"/>
+          </a:fontRef>
+        </p:style>
+      </p:cxnSp>
+      <p:cxnSp>
+        <p:nvCxnSpPr>
+          <p:cNvPr id="206" name="205 Conector recto de flecha"/>
+          <p:cNvCxnSpPr>
+            <a:stCxn id="33" idx="1"/>
+            <a:endCxn id="32" idx="3"/>
+          </p:cNvCxnSpPr>
+          <p:nvPr/>
+        </p:nvCxnSpPr>
+        <p:spPr>
+          <a:xfrm flipH="1">
+            <a:off x="4644008" y="1196752"/>
+            <a:ext cx="504056" cy="0"/>
+          </a:xfrm>
+          <a:prstGeom prst="straightConnector1">
+            <a:avLst/>
+          </a:prstGeom>
+          <a:ln>
+            <a:solidFill>
+              <a:schemeClr val="accent6">
+                <a:lumMod val="75000"/>
+              </a:schemeClr>
+            </a:solidFill>
+            <a:tailEnd type="arrow"/>
+          </a:ln>
+        </p:spPr>
+        <p:style>
+          <a:lnRef idx="1">
+            <a:schemeClr val="accent1"/>
+          </a:lnRef>
+          <a:fillRef idx="0">
+            <a:schemeClr val="accent1"/>
+          </a:fillRef>
+          <a:effectRef idx="0">
+            <a:schemeClr val="accent1"/>
+          </a:effectRef>
+          <a:fontRef idx="minor">
+            <a:schemeClr val="tx1"/>
+          </a:fontRef>
+        </p:style>
+      </p:cxnSp>
+      <p:cxnSp>
+        <p:nvCxnSpPr>
+          <p:cNvPr id="208" name="207 Conector recto de flecha"/>
+          <p:cNvCxnSpPr/>
+          <p:nvPr/>
+        </p:nvCxnSpPr>
+        <p:spPr>
+          <a:xfrm>
+            <a:off x="6804248" y="1556792"/>
+            <a:ext cx="432048" cy="0"/>
+          </a:xfrm>
+          <a:prstGeom prst="straightConnector1">
+            <a:avLst/>
+          </a:prstGeom>
+          <a:ln>
+            <a:solidFill>
+              <a:schemeClr val="accent6">
+                <a:lumMod val="75000"/>
+              </a:schemeClr>
+            </a:solidFill>
+            <a:tailEnd type="arrow"/>
+          </a:ln>
+        </p:spPr>
+        <p:style>
+          <a:lnRef idx="1">
+            <a:schemeClr val="accent1"/>
+          </a:lnRef>
+          <a:fillRef idx="0">
+            <a:schemeClr val="accent1"/>
+          </a:fillRef>
+          <a:effectRef idx="0">
+            <a:schemeClr val="accent1"/>
+          </a:effectRef>
+          <a:fontRef idx="minor">
+            <a:schemeClr val="tx1"/>
+          </a:fontRef>
+        </p:style>
+      </p:cxnSp>
+      <p:cxnSp>
+        <p:nvCxnSpPr>
+          <p:cNvPr id="210" name="209 Conector recto de flecha"/>
+          <p:cNvCxnSpPr/>
+          <p:nvPr/>
+        </p:nvCxnSpPr>
+        <p:spPr>
+          <a:xfrm>
+            <a:off x="6804248" y="1628800"/>
+            <a:ext cx="432048" cy="0"/>
+          </a:xfrm>
+          <a:prstGeom prst="straightConnector1">
+            <a:avLst/>
+          </a:prstGeom>
+          <a:ln>
+            <a:solidFill>
+              <a:schemeClr val="accent6">
+                <a:lumMod val="75000"/>
+              </a:schemeClr>
+            </a:solidFill>
+            <a:tailEnd type="arrow"/>
+          </a:ln>
+        </p:spPr>
+        <p:style>
+          <a:lnRef idx="1">
+            <a:schemeClr val="accent1"/>
+          </a:lnRef>
+          <a:fillRef idx="0">
+            <a:schemeClr val="accent1"/>
+          </a:fillRef>
+          <a:effectRef idx="0">
+            <a:schemeClr val="accent1"/>
+          </a:effectRef>
+          <a:fontRef idx="minor">
+            <a:schemeClr val="tx1"/>
+          </a:fontRef>
+        </p:style>
+      </p:cxnSp>
+      <p:cxnSp>
+        <p:nvCxnSpPr>
+          <p:cNvPr id="212" name="211 Conector recto de flecha"/>
+          <p:cNvCxnSpPr/>
+          <p:nvPr/>
+        </p:nvCxnSpPr>
+        <p:spPr>
+          <a:xfrm>
+            <a:off x="6804248" y="1772816"/>
+            <a:ext cx="432048" cy="0"/>
+          </a:xfrm>
+          <a:prstGeom prst="straightConnector1">
+            <a:avLst/>
+          </a:prstGeom>
+          <a:ln>
+            <a:solidFill>
+              <a:schemeClr val="accent6">
+                <a:lumMod val="75000"/>
+              </a:schemeClr>
+            </a:solidFill>
+            <a:tailEnd type="arrow"/>
+          </a:ln>
+        </p:spPr>
+        <p:style>
+          <a:lnRef idx="1">
+            <a:schemeClr val="accent1"/>
+          </a:lnRef>
+          <a:fillRef idx="0">
+            <a:schemeClr val="accent1"/>
+          </a:fillRef>
+          <a:effectRef idx="0">
+            <a:schemeClr val="accent1"/>
+          </a:effectRef>
+          <a:fontRef idx="minor">
+            <a:schemeClr val="tx1"/>
+          </a:fontRef>
+        </p:style>
+      </p:cxnSp>
+      <p:cxnSp>
+        <p:nvCxnSpPr>
+          <p:cNvPr id="215" name="214 Forma"/>
+          <p:cNvCxnSpPr>
+            <a:stCxn id="81" idx="0"/>
+          </p:cNvCxnSpPr>
+          <p:nvPr/>
+        </p:nvCxnSpPr>
+        <p:spPr>
+          <a:xfrm rot="16200000" flipV="1">
+            <a:off x="2573778" y="1106742"/>
+            <a:ext cx="216025" cy="540060"/>
+          </a:xfrm>
+          <a:prstGeom prst="bentConnector2">
+            <a:avLst/>
+          </a:prstGeom>
+          <a:ln>
+            <a:solidFill>
+              <a:schemeClr val="accent6">
+                <a:lumMod val="75000"/>
+              </a:schemeClr>
+            </a:solidFill>
+            <a:tailEnd type="arrow"/>
+          </a:ln>
+        </p:spPr>
+        <p:style>
+          <a:lnRef idx="1">
+            <a:schemeClr val="accent1"/>
+          </a:lnRef>
+          <a:fillRef idx="0">
+            <a:schemeClr val="accent1"/>
+          </a:fillRef>
+          <a:effectRef idx="0">
+            <a:schemeClr val="accent1"/>
+          </a:effectRef>
+          <a:fontRef idx="minor">
+            <a:schemeClr val="tx1"/>
+          </a:fontRef>
+        </p:style>
+      </p:cxnSp>
+      <p:cxnSp>
+        <p:nvCxnSpPr>
+          <p:cNvPr id="218" name="217 Conector recto de flecha"/>
+          <p:cNvCxnSpPr/>
+          <p:nvPr/>
+        </p:nvCxnSpPr>
+        <p:spPr>
+          <a:xfrm flipH="1">
+            <a:off x="2411760" y="1124744"/>
+            <a:ext cx="1224136" cy="0"/>
+          </a:xfrm>
+          <a:prstGeom prst="straightConnector1">
+            <a:avLst/>
+          </a:prstGeom>
+          <a:ln>
+            <a:solidFill>
+              <a:schemeClr val="accent6">
+                <a:lumMod val="75000"/>
+              </a:schemeClr>
+            </a:solidFill>
+            <a:tailEnd type="arrow"/>
+          </a:ln>
+        </p:spPr>
+        <p:style>
+          <a:lnRef idx="1">
+            <a:schemeClr val="accent1"/>
+          </a:lnRef>
+          <a:fillRef idx="0">
+            <a:schemeClr val="accent1"/>
+          </a:fillRef>
+          <a:effectRef idx="0">
+            <a:schemeClr val="accent1"/>
+          </a:effectRef>
+          <a:fontRef idx="minor">
+            <a:schemeClr val="tx1"/>
+          </a:fontRef>
+        </p:style>
+      </p:cxnSp>
+      <p:cxnSp>
+        <p:nvCxnSpPr>
+          <p:cNvPr id="222" name="221 Forma"/>
+          <p:cNvCxnSpPr>
+            <a:stCxn id="58" idx="1"/>
+          </p:cNvCxnSpPr>
+          <p:nvPr/>
+        </p:nvCxnSpPr>
+        <p:spPr>
+          <a:xfrm rot="10800000">
+            <a:off x="2123728" y="1412776"/>
+            <a:ext cx="288032" cy="684076"/>
+          </a:xfrm>
+          <a:prstGeom prst="bentConnector2">
+            <a:avLst/>
+          </a:prstGeom>
+          <a:ln>
+            <a:solidFill>
+              <a:schemeClr val="accent6">
+                <a:lumMod val="75000"/>
+              </a:schemeClr>
+            </a:solidFill>
+            <a:tailEnd type="arrow"/>
+          </a:ln>
+        </p:spPr>
+        <p:style>
+          <a:lnRef idx="1">
+            <a:schemeClr val="accent1"/>
+          </a:lnRef>
+          <a:fillRef idx="0">
+            <a:schemeClr val="accent1"/>
+          </a:fillRef>
+          <a:effectRef idx="0">
+            <a:schemeClr val="accent1"/>
+          </a:effectRef>
+          <a:fontRef idx="minor">
+            <a:schemeClr val="tx1"/>
+          </a:fontRef>
+        </p:style>
+      </p:cxnSp>
+      <p:cxnSp>
+        <p:nvCxnSpPr>
+          <p:cNvPr id="224" name="223 Conector recto de flecha"/>
+          <p:cNvCxnSpPr>
+            <a:stCxn id="67" idx="0"/>
+          </p:cNvCxnSpPr>
+          <p:nvPr/>
+        </p:nvCxnSpPr>
+        <p:spPr>
+          <a:xfrm flipH="1" flipV="1">
+            <a:off x="1835696" y="1412776"/>
+            <a:ext cx="36004" cy="1008112"/>
+          </a:xfrm>
+          <a:prstGeom prst="straightConnector1">
+            <a:avLst/>
+          </a:prstGeom>
+          <a:ln>
+            <a:solidFill>
+              <a:schemeClr val="accent6">
+                <a:lumMod val="75000"/>
+              </a:schemeClr>
+            </a:solidFill>
+            <a:tailEnd type="arrow"/>
+          </a:ln>
+        </p:spPr>
+        <p:style>
+          <a:lnRef idx="1">
+            <a:schemeClr val="accent1"/>
+          </a:lnRef>
+          <a:fillRef idx="0">
+            <a:schemeClr val="accent1"/>
+          </a:fillRef>
+          <a:effectRef idx="0">
+            <a:schemeClr val="accent1"/>
+          </a:effectRef>
+          <a:fontRef idx="minor">
+            <a:schemeClr val="tx1"/>
+          </a:fontRef>
+        </p:style>
+      </p:cxnSp>
+      <p:cxnSp>
+        <p:nvCxnSpPr>
+          <p:cNvPr id="230" name="229 Conector recto"/>
+          <p:cNvCxnSpPr/>
+          <p:nvPr/>
+        </p:nvCxnSpPr>
+        <p:spPr>
+          <a:xfrm>
+            <a:off x="1619672" y="620688"/>
+            <a:ext cx="0" cy="432048"/>
+          </a:xfrm>
+          <a:prstGeom prst="line">
+            <a:avLst/>
+          </a:prstGeom>
+          <a:ln>
+            <a:solidFill>
+              <a:schemeClr val="accent6">
+                <a:lumMod val="75000"/>
+              </a:schemeClr>
+            </a:solidFill>
+            <a:tailEnd type="none"/>
+          </a:ln>
+        </p:spPr>
+        <p:style>
+          <a:lnRef idx="1">
+            <a:schemeClr val="accent1"/>
+          </a:lnRef>
+          <a:fillRef idx="0">
+            <a:schemeClr val="accent1"/>
+          </a:fillRef>
+          <a:effectRef idx="0">
+            <a:schemeClr val="accent1"/>
+          </a:effectRef>
+          <a:fontRef idx="minor">
+            <a:schemeClr val="tx1"/>
+          </a:fontRef>
+        </p:style>
+      </p:cxnSp>
+      <p:cxnSp>
+        <p:nvCxnSpPr>
+          <p:cNvPr id="232" name="231 Conector angular"/>
+          <p:cNvCxnSpPr/>
+          <p:nvPr/>
+        </p:nvCxnSpPr>
+        <p:spPr>
+          <a:xfrm>
+            <a:off x="1619672" y="620688"/>
+            <a:ext cx="4032448" cy="360040"/>
+          </a:xfrm>
+          <a:prstGeom prst="bentConnector3">
+            <a:avLst>
+              <a:gd name="adj1" fmla="val 99945"/>
+            </a:avLst>
+          </a:prstGeom>
+          <a:ln>
+            <a:solidFill>
+              <a:schemeClr val="accent6">
+                <a:lumMod val="75000"/>
+              </a:schemeClr>
+            </a:solidFill>
+            <a:tailEnd type="arrow"/>
+          </a:ln>
+        </p:spPr>
+        <p:style>
+          <a:lnRef idx="1">
+            <a:schemeClr val="accent1"/>
+          </a:lnRef>
+          <a:fillRef idx="0">
+            <a:schemeClr val="accent1"/>
+          </a:fillRef>
+          <a:effectRef idx="0">
+            <a:schemeClr val="accent1"/>
+          </a:effectRef>
+          <a:fontRef idx="minor">
+            <a:schemeClr val="tx1"/>
+          </a:fontRef>
+        </p:style>
+      </p:cxnSp>
     </p:spTree>
   </p:cSld>
   <p:clrMapOvr>

</xml_diff>